<commit_message>
Progress on intermediate presentation
</commit_message>
<xml_diff>
--- a/presentations/intermediate/intermediate.pptx
+++ b/presentations/intermediate/intermediate.pptx
@@ -5,19 +5,20 @@
     <p:sldMasterId id="2147483648" r:id="rId1"/>
   </p:sldMasterIdLst>
   <p:notesMasterIdLst>
-    <p:notesMasterId r:id="rId9"/>
+    <p:notesMasterId r:id="rId10"/>
   </p:notesMasterIdLst>
   <p:handoutMasterIdLst>
-    <p:handoutMasterId r:id="rId10"/>
+    <p:handoutMasterId r:id="rId11"/>
   </p:handoutMasterIdLst>
   <p:sldIdLst>
     <p:sldId id="256" r:id="rId2"/>
     <p:sldId id="296" r:id="rId3"/>
-    <p:sldId id="304" r:id="rId4"/>
-    <p:sldId id="313" r:id="rId5"/>
-    <p:sldId id="307" r:id="rId6"/>
+    <p:sldId id="314" r:id="rId4"/>
+    <p:sldId id="304" r:id="rId5"/>
+    <p:sldId id="313" r:id="rId6"/>
     <p:sldId id="298" r:id="rId7"/>
-    <p:sldId id="299" r:id="rId8"/>
+    <p:sldId id="307" r:id="rId8"/>
+    <p:sldId id="299" r:id="rId9"/>
   </p:sldIdLst>
   <p:sldSz cx="12192000" cy="6858000"/>
   <p:notesSz cx="6858000" cy="9144000"/>
@@ -209,7 +210,7 @@
           <a:p>
             <a:fld id="{02C2AC28-A929-441C-B26F-33372D7AE1E9}" type="datetime1">
               <a:rPr lang="de-DE" smtClean="0"/>
-              <a:t>02.12.2019</a:t>
+              <a:t>09.12.2019</a:t>
             </a:fld>
             <a:endParaRPr lang="de-DE"/>
           </a:p>
@@ -375,7 +376,7 @@
           <a:p>
             <a:fld id="{B8BE6BEF-7509-4BB5-B095-4F03E42167A1}" type="datetime1">
               <a:rPr lang="de-DE" smtClean="0"/>
-              <a:t>02.12.2019</a:t>
+              <a:t>09.12.2019</a:t>
             </a:fld>
             <a:endParaRPr lang="de-DE"/>
           </a:p>
@@ -735,7 +736,7 @@
           <a:p>
             <a:fld id="{A5A19A28-71E2-4E92-9978-57F0848F3467}" type="datetime1">
               <a:rPr lang="de-DE" smtClean="0"/>
-              <a:t>02.12.2019</a:t>
+              <a:t>09.12.2019</a:t>
             </a:fld>
             <a:endParaRPr lang="de-DE"/>
           </a:p>
@@ -880,7 +881,7 @@
           <a:p>
             <a:fld id="{9B75D2A7-CDF9-4C4B-B580-1432AC32AB98}" type="datetime1">
               <a:rPr lang="de-DE" smtClean="0"/>
-              <a:t>02.12.2019</a:t>
+              <a:t>09.12.2019</a:t>
             </a:fld>
             <a:endParaRPr lang="de-DE"/>
           </a:p>
@@ -1029,7 +1030,7 @@
           <a:p>
             <a:fld id="{F4D9776A-D9BD-4B72-BDC9-BA911DB08F4C}" type="datetime1">
               <a:rPr lang="de-DE" smtClean="0"/>
-              <a:t>02.12.2019</a:t>
+              <a:t>09.12.2019</a:t>
             </a:fld>
             <a:endParaRPr lang="de-DE"/>
           </a:p>
@@ -1071,7 +1072,7 @@
           <a:p>
             <a:fld id="{E3183F9E-400F-4DFF-BD42-09DB006F263D}" type="slidenum">
               <a:rPr lang="de-DE" smtClean="0"/>
-              <a:t>3</a:t>
+              <a:t>4</a:t>
             </a:fld>
             <a:endParaRPr lang="de-DE"/>
           </a:p>
@@ -1178,7 +1179,7 @@
           <a:p>
             <a:fld id="{F4D9776A-D9BD-4B72-BDC9-BA911DB08F4C}" type="datetime1">
               <a:rPr lang="de-DE" smtClean="0"/>
-              <a:t>02.12.2019</a:t>
+              <a:t>09.12.2019</a:t>
             </a:fld>
             <a:endParaRPr lang="de-DE"/>
           </a:p>
@@ -1220,7 +1221,7 @@
           <a:p>
             <a:fld id="{E3183F9E-400F-4DFF-BD42-09DB006F263D}" type="slidenum">
               <a:rPr lang="de-DE" smtClean="0"/>
-              <a:t>4</a:t>
+              <a:t>5</a:t>
             </a:fld>
             <a:endParaRPr lang="de-DE"/>
           </a:p>
@@ -1325,9 +1326,9 @@
           <a:bodyPr/>
           <a:lstStyle/>
           <a:p>
-            <a:fld id="{03B845CB-A69F-4DFD-B35B-E7C972EA0B86}" type="datetime1">
+            <a:fld id="{A3D4EC88-24C7-4B99-9581-356DE09D2BA2}" type="datetime1">
               <a:rPr lang="de-DE" smtClean="0"/>
-              <a:t>02.12.2019</a:t>
+              <a:t>09.12.2019</a:t>
             </a:fld>
             <a:endParaRPr lang="de-DE"/>
           </a:p>
@@ -1369,7 +1370,7 @@
           <a:p>
             <a:fld id="{E3183F9E-400F-4DFF-BD42-09DB006F263D}" type="slidenum">
               <a:rPr lang="de-DE" smtClean="0"/>
-              <a:t>5</a:t>
+              <a:t>6</a:t>
             </a:fld>
             <a:endParaRPr lang="de-DE"/>
           </a:p>
@@ -1378,7 +1379,7 @@
     </p:spTree>
     <p:extLst>
       <p:ext uri="{BB962C8B-B14F-4D97-AF65-F5344CB8AC3E}">
-        <p14:creationId xmlns:p14="http://schemas.microsoft.com/office/powerpoint/2010/main" val="3149973066"/>
+        <p14:creationId xmlns:p14="http://schemas.microsoft.com/office/powerpoint/2010/main" val="2865844619"/>
       </p:ext>
     </p:extLst>
   </p:cSld>
@@ -1474,9 +1475,9 @@
           <a:bodyPr/>
           <a:lstStyle/>
           <a:p>
-            <a:fld id="{A3D4EC88-24C7-4B99-9581-356DE09D2BA2}" type="datetime1">
+            <a:fld id="{03B845CB-A69F-4DFD-B35B-E7C972EA0B86}" type="datetime1">
               <a:rPr lang="de-DE" smtClean="0"/>
-              <a:t>02.12.2019</a:t>
+              <a:t>09.12.2019</a:t>
             </a:fld>
             <a:endParaRPr lang="de-DE"/>
           </a:p>
@@ -1518,7 +1519,7 @@
           <a:p>
             <a:fld id="{E3183F9E-400F-4DFF-BD42-09DB006F263D}" type="slidenum">
               <a:rPr lang="de-DE" smtClean="0"/>
-              <a:t>6</a:t>
+              <a:t>7</a:t>
             </a:fld>
             <a:endParaRPr lang="de-DE"/>
           </a:p>
@@ -1527,7 +1528,7 @@
     </p:spTree>
     <p:extLst>
       <p:ext uri="{BB962C8B-B14F-4D97-AF65-F5344CB8AC3E}">
-        <p14:creationId xmlns:p14="http://schemas.microsoft.com/office/powerpoint/2010/main" val="2865844619"/>
+        <p14:creationId xmlns:p14="http://schemas.microsoft.com/office/powerpoint/2010/main" val="3149973066"/>
       </p:ext>
     </p:extLst>
   </p:cSld>
@@ -1671,7 +1672,7 @@
           <a:lstStyle/>
           <a:p>
             <a:r>
-              <a:rPr lang="en-US" smtClean="0"/>
+              <a:rPr lang="en-US"/>
               <a:t>16.12.2019</a:t>
             </a:r>
             <a:endParaRPr lang="de-DE"/>
@@ -1987,7 +1988,7 @@
           <a:lstStyle/>
           <a:p>
             <a:r>
-              <a:rPr lang="en-US" smtClean="0"/>
+              <a:rPr lang="en-US"/>
               <a:t>16.12.2019</a:t>
             </a:r>
             <a:endParaRPr lang="de-DE"/>
@@ -2174,7 +2175,7 @@
           <a:lstStyle/>
           <a:p>
             <a:r>
-              <a:rPr lang="en-US" smtClean="0"/>
+              <a:rPr lang="en-US"/>
               <a:t>16.12.2019</a:t>
             </a:r>
             <a:endParaRPr lang="de-DE"/>
@@ -2361,7 +2362,7 @@
           <a:lstStyle/>
           <a:p>
             <a:r>
-              <a:rPr lang="en-US" smtClean="0"/>
+              <a:rPr lang="en-US"/>
               <a:t>16.12.2019</a:t>
             </a:r>
             <a:endParaRPr lang="de-DE"/>
@@ -2744,7 +2745,7 @@
           <a:lstStyle/>
           <a:p>
             <a:r>
-              <a:rPr lang="en-US" smtClean="0"/>
+              <a:rPr lang="en-US"/>
               <a:t>16.12.2019</a:t>
             </a:r>
             <a:endParaRPr lang="de-DE"/>
@@ -2990,7 +2991,7 @@
           <a:lstStyle/>
           <a:p>
             <a:r>
-              <a:rPr lang="en-US" smtClean="0"/>
+              <a:rPr lang="en-US"/>
               <a:t>16.12.2019</a:t>
             </a:r>
             <a:endParaRPr lang="de-DE"/>
@@ -3372,7 +3373,7 @@
           <a:lstStyle/>
           <a:p>
             <a:r>
-              <a:rPr lang="en-US" smtClean="0"/>
+              <a:rPr lang="en-US"/>
               <a:t>16.12.2019</a:t>
             </a:r>
             <a:endParaRPr lang="de-DE"/>
@@ -3500,7 +3501,7 @@
           <a:lstStyle/>
           <a:p>
             <a:r>
-              <a:rPr lang="en-US" smtClean="0"/>
+              <a:rPr lang="en-US"/>
               <a:t>16.12.2019</a:t>
             </a:r>
             <a:endParaRPr lang="de-DE"/>
@@ -3598,7 +3599,7 @@
           <a:lstStyle/>
           <a:p>
             <a:r>
-              <a:rPr lang="en-US" smtClean="0"/>
+              <a:rPr lang="en-US"/>
               <a:t>16.12.2019</a:t>
             </a:r>
             <a:endParaRPr lang="de-DE"/>
@@ -3885,7 +3886,7 @@
           <a:lstStyle/>
           <a:p>
             <a:r>
-              <a:rPr lang="en-US" smtClean="0"/>
+              <a:rPr lang="en-US"/>
               <a:t>16.12.2019</a:t>
             </a:r>
             <a:endParaRPr lang="de-DE"/>
@@ -4149,7 +4150,7 @@
           <a:lstStyle/>
           <a:p>
             <a:r>
-              <a:rPr lang="en-US" smtClean="0"/>
+              <a:rPr lang="en-US"/>
               <a:t>16.12.2019</a:t>
             </a:r>
             <a:endParaRPr lang="de-DE"/>
@@ -4363,7 +4364,7 @@
           </a:lstStyle>
           <a:p>
             <a:r>
-              <a:rPr lang="en-US" smtClean="0"/>
+              <a:rPr lang="en-US"/>
               <a:t>16.12.2019</a:t>
             </a:r>
             <a:endParaRPr lang="de-DE"/>
@@ -4802,7 +4803,7 @@
           <a:lstStyle/>
           <a:p>
             <a:r>
-              <a:rPr lang="de-DE" dirty="0" smtClean="0"/>
+              <a:rPr lang="de-DE" dirty="0"/>
               <a:t>Intermediate </a:t>
             </a:r>
             <a:r>
@@ -4872,17 +4873,9 @@
             <a:br>
               <a:rPr lang="de-DE" dirty="0"/>
             </a:br>
-            <a:r>
-              <a:rPr lang="de-DE" dirty="0"/>
-              <a:t/>
-            </a:r>
             <a:br>
               <a:rPr lang="de-DE" dirty="0"/>
             </a:br>
-            <a:r>
-              <a:rPr lang="de-DE" dirty="0"/>
-              <a:t/>
-            </a:r>
             <a:br>
               <a:rPr lang="de-DE" dirty="0"/>
             </a:br>
@@ -5026,7 +5019,7 @@
           <a:lstStyle/>
           <a:p>
             <a:r>
-              <a:rPr lang="en-US" smtClean="0"/>
+              <a:rPr lang="en-US"/>
               <a:t>16.12.2019</a:t>
             </a:r>
             <a:endParaRPr lang="de-DE" dirty="0"/>
@@ -5171,7 +5164,7 @@
           <a:lstStyle/>
           <a:p>
             <a:r>
-              <a:rPr lang="en-US" smtClean="0"/>
+              <a:rPr lang="en-US"/>
               <a:t>16.12.2019</a:t>
             </a:r>
             <a:endParaRPr lang="de-DE"/>
@@ -5257,66 +5250,6 @@
           </a:p>
         </p:txBody>
       </p:sp>
-      <p:pic>
-        <p:nvPicPr>
-          <p:cNvPr id="7" name="Grafik 6">
-            <a:extLst>
-              <a:ext uri="{FF2B5EF4-FFF2-40B4-BE49-F238E27FC236}">
-                <a16:creationId xmlns:a16="http://schemas.microsoft.com/office/drawing/2014/main" id="{9829DD0F-935C-4822-B454-79428C72E3AA}"/>
-              </a:ext>
-            </a:extLst>
-          </p:cNvPr>
-          <p:cNvPicPr>
-            <a:picLocks noChangeAspect="1"/>
-          </p:cNvPicPr>
-          <p:nvPr/>
-        </p:nvPicPr>
-        <p:blipFill>
-          <a:blip r:embed="rId3"/>
-          <a:stretch>
-            <a:fillRect/>
-          </a:stretch>
-        </p:blipFill>
-        <p:spPr>
-          <a:xfrm>
-            <a:off x="628997" y="2357244"/>
-            <a:ext cx="2554496" cy="2484880"/>
-          </a:xfrm>
-          <a:prstGeom prst="rect">
-            <a:avLst/>
-          </a:prstGeom>
-        </p:spPr>
-      </p:pic>
-      <p:pic>
-        <p:nvPicPr>
-          <p:cNvPr id="3" name="Grafik 2">
-            <a:extLst>
-              <a:ext uri="{FF2B5EF4-FFF2-40B4-BE49-F238E27FC236}">
-                <a16:creationId xmlns:a16="http://schemas.microsoft.com/office/drawing/2014/main" id="{DAF72627-E3CA-4789-9ED3-A15ADF496500}"/>
-              </a:ext>
-            </a:extLst>
-          </p:cNvPr>
-          <p:cNvPicPr>
-            <a:picLocks noChangeAspect="1"/>
-          </p:cNvPicPr>
-          <p:nvPr/>
-        </p:nvPicPr>
-        <p:blipFill>
-          <a:blip r:embed="rId4"/>
-          <a:stretch>
-            <a:fillRect/>
-          </a:stretch>
-        </p:blipFill>
-        <p:spPr>
-          <a:xfrm>
-            <a:off x="7748130" y="1744232"/>
-            <a:ext cx="3814873" cy="3710904"/>
-          </a:xfrm>
-          <a:prstGeom prst="rect">
-            <a:avLst/>
-          </a:prstGeom>
-        </p:spPr>
-      </p:pic>
       <p:cxnSp>
         <p:nvCxnSpPr>
           <p:cNvPr id="12" name="Gerade Verbindung mit Pfeil 11">
@@ -5327,15 +5260,14 @@
             </a:extLst>
           </p:cNvPr>
           <p:cNvCxnSpPr>
-            <a:stCxn id="7" idx="3"/>
-            <a:endCxn id="3" idx="1"/>
+            <a:cxnSpLocks/>
           </p:cNvCxnSpPr>
           <p:nvPr/>
         </p:nvCxnSpPr>
         <p:spPr>
           <a:xfrm>
-            <a:off x="3183493" y="3599684"/>
-            <a:ext cx="4564637" cy="0"/>
+            <a:off x="3732756" y="3599684"/>
+            <a:ext cx="4015374" cy="0"/>
           </a:xfrm>
           <a:prstGeom prst="straightConnector1">
             <a:avLst/>
@@ -5373,13 +5305,14 @@
           </p:cNvPr>
           <p:cNvCxnSpPr>
             <a:cxnSpLocks/>
+            <a:stCxn id="8" idx="2"/>
           </p:cNvCxnSpPr>
           <p:nvPr/>
         </p:nvCxnSpPr>
         <p:spPr>
           <a:xfrm>
-            <a:off x="5190298" y="1669332"/>
-            <a:ext cx="0" cy="1893281"/>
+            <a:off x="5771233" y="2152121"/>
+            <a:ext cx="0" cy="1077252"/>
           </a:xfrm>
           <a:prstGeom prst="straightConnector1">
             <a:avLst/>
@@ -5408,10 +5341,301 @@
       </p:cxnSp>
       <p:sp>
         <p:nvSpPr>
-          <p:cNvPr id="15" name="Textfeld 14">
+          <p:cNvPr id="8" name="Rechteck 7">
             <a:extLst>
               <a:ext uri="{FF2B5EF4-FFF2-40B4-BE49-F238E27FC236}">
-                <a16:creationId xmlns:a16="http://schemas.microsoft.com/office/drawing/2014/main" id="{53420B00-6CAC-4B67-AAEF-DAA7F010E739}"/>
+                <a16:creationId xmlns:a16="http://schemas.microsoft.com/office/drawing/2014/main" id="{901558D0-B0FF-4960-BD13-726A9EDAAE2D}"/>
+              </a:ext>
+            </a:extLst>
+          </p:cNvPr>
+          <p:cNvSpPr/>
+          <p:nvPr/>
+        </p:nvSpPr>
+        <p:spPr>
+          <a:xfrm>
+            <a:off x="4172425" y="1411499"/>
+            <a:ext cx="3197616" cy="740622"/>
+          </a:xfrm>
+          <a:prstGeom prst="rect">
+            <a:avLst/>
+          </a:prstGeom>
+          <a:noFill/>
+          <a:ln w="28575">
+            <a:solidFill>
+              <a:srgbClr val="C50E1F"/>
+            </a:solidFill>
+          </a:ln>
+        </p:spPr>
+        <p:style>
+          <a:lnRef idx="2">
+            <a:schemeClr val="accent1">
+              <a:shade val="50000"/>
+            </a:schemeClr>
+          </a:lnRef>
+          <a:fillRef idx="1">
+            <a:schemeClr val="accent1"/>
+          </a:fillRef>
+          <a:effectRef idx="0">
+            <a:schemeClr val="accent1"/>
+          </a:effectRef>
+          <a:fontRef idx="minor">
+            <a:schemeClr val="lt1"/>
+          </a:fontRef>
+        </p:style>
+        <p:txBody>
+          <a:bodyPr rtlCol="0" anchor="ctr"/>
+          <a:lstStyle/>
+          <a:p>
+            <a:pPr algn="ctr"/>
+            <a:r>
+              <a:rPr lang="de-DE" sz="2400" dirty="0" err="1">
+                <a:solidFill>
+                  <a:srgbClr val="C50E1F"/>
+                </a:solidFill>
+              </a:rPr>
+              <a:t>Physically-based</a:t>
+            </a:r>
+            <a:r>
+              <a:rPr lang="de-DE" sz="2400" dirty="0">
+                <a:solidFill>
+                  <a:srgbClr val="C50E1F"/>
+                </a:solidFill>
+              </a:rPr>
+              <a:t> </a:t>
+            </a:r>
+          </a:p>
+          <a:p>
+            <a:pPr algn="ctr"/>
+            <a:r>
+              <a:rPr lang="de-DE" sz="2400" dirty="0" err="1">
+                <a:solidFill>
+                  <a:srgbClr val="C50E1F"/>
+                </a:solidFill>
+              </a:rPr>
+              <a:t>Differentiable</a:t>
+            </a:r>
+            <a:r>
+              <a:rPr lang="de-DE" sz="2400" dirty="0">
+                <a:solidFill>
+                  <a:srgbClr val="C50E1F"/>
+                </a:solidFill>
+              </a:rPr>
+              <a:t> Renderer</a:t>
+            </a:r>
+          </a:p>
+        </p:txBody>
+      </p:sp>
+      <p:sp>
+        <p:nvSpPr>
+          <p:cNvPr id="20" name="Rechteck 19">
+            <a:extLst>
+              <a:ext uri="{FF2B5EF4-FFF2-40B4-BE49-F238E27FC236}">
+                <a16:creationId xmlns:a16="http://schemas.microsoft.com/office/drawing/2014/main" id="{4FD9B008-1EED-466A-B0C5-400325255D69}"/>
+              </a:ext>
+            </a:extLst>
+          </p:cNvPr>
+          <p:cNvSpPr/>
+          <p:nvPr/>
+        </p:nvSpPr>
+        <p:spPr>
+          <a:xfrm>
+            <a:off x="5362031" y="3229373"/>
+            <a:ext cx="810712" cy="740622"/>
+          </a:xfrm>
+          <a:prstGeom prst="rect">
+            <a:avLst/>
+          </a:prstGeom>
+          <a:solidFill>
+            <a:schemeClr val="bg1"/>
+          </a:solidFill>
+          <a:ln w="28575">
+            <a:solidFill>
+              <a:schemeClr val="tx1"/>
+            </a:solidFill>
+          </a:ln>
+        </p:spPr>
+        <p:style>
+          <a:lnRef idx="2">
+            <a:schemeClr val="accent1">
+              <a:shade val="50000"/>
+            </a:schemeClr>
+          </a:lnRef>
+          <a:fillRef idx="1">
+            <a:schemeClr val="accent1"/>
+          </a:fillRef>
+          <a:effectRef idx="0">
+            <a:schemeClr val="accent1"/>
+          </a:effectRef>
+          <a:fontRef idx="minor">
+            <a:schemeClr val="lt1"/>
+          </a:fontRef>
+        </p:style>
+        <p:txBody>
+          <a:bodyPr rtlCol="0" anchor="ctr"/>
+          <a:lstStyle/>
+          <a:p>
+            <a:pPr algn="ctr"/>
+            <a:r>
+              <a:rPr lang="de-DE" sz="2400" dirty="0">
+                <a:solidFill>
+                  <a:schemeClr val="tx1"/>
+                </a:solidFill>
+              </a:rPr>
+              <a:t>CNN</a:t>
+            </a:r>
+          </a:p>
+        </p:txBody>
+      </p:sp>
+      <p:pic>
+        <p:nvPicPr>
+          <p:cNvPr id="21" name="Grafik 20" descr="Ein Bild, das Gebäude, sitzend, Rock, alt enthält.&#10;&#10;Automatisch generierte Beschreibung">
+            <a:extLst>
+              <a:ext uri="{FF2B5EF4-FFF2-40B4-BE49-F238E27FC236}">
+                <a16:creationId xmlns:a16="http://schemas.microsoft.com/office/drawing/2014/main" id="{16D36F25-4596-4C04-9C89-9765AE8E9F67}"/>
+              </a:ext>
+            </a:extLst>
+          </p:cNvPr>
+          <p:cNvPicPr>
+            <a:picLocks noChangeAspect="1"/>
+          </p:cNvPicPr>
+          <p:nvPr/>
+        </p:nvPicPr>
+        <p:blipFill>
+          <a:blip r:embed="rId3">
+            <a:extLst>
+              <a:ext uri="{28A0092B-C50C-407E-A947-70E740481C1C}">
+                <a14:useLocalDpi xmlns:a14="http://schemas.microsoft.com/office/drawing/2010/main" val="0"/>
+              </a:ext>
+            </a:extLst>
+          </a:blip>
+          <a:stretch>
+            <a:fillRect/>
+          </a:stretch>
+        </p:blipFill>
+        <p:spPr>
+          <a:xfrm>
+            <a:off x="2309570" y="2019565"/>
+            <a:ext cx="1324568" cy="1324568"/>
+          </a:xfrm>
+          <a:prstGeom prst="rect">
+            <a:avLst/>
+          </a:prstGeom>
+        </p:spPr>
+      </p:pic>
+      <p:pic>
+        <p:nvPicPr>
+          <p:cNvPr id="23" name="Grafik 22" descr="Ein Bild, das Schnee, bedeckt, Feuer, weiß enthält.&#10;&#10;Automatisch generierte Beschreibung">
+            <a:extLst>
+              <a:ext uri="{FF2B5EF4-FFF2-40B4-BE49-F238E27FC236}">
+                <a16:creationId xmlns:a16="http://schemas.microsoft.com/office/drawing/2014/main" id="{E18B0F43-0E11-4E6C-A5E7-5EB28265BD17}"/>
+              </a:ext>
+            </a:extLst>
+          </p:cNvPr>
+          <p:cNvPicPr>
+            <a:picLocks noChangeAspect="1"/>
+          </p:cNvPicPr>
+          <p:nvPr/>
+        </p:nvPicPr>
+        <p:blipFill>
+          <a:blip r:embed="rId4">
+            <a:extLst>
+              <a:ext uri="{28A0092B-C50C-407E-A947-70E740481C1C}">
+                <a14:useLocalDpi xmlns:a14="http://schemas.microsoft.com/office/drawing/2010/main" val="0"/>
+              </a:ext>
+            </a:extLst>
+          </a:blip>
+          <a:stretch>
+            <a:fillRect/>
+          </a:stretch>
+        </p:blipFill>
+        <p:spPr>
+          <a:xfrm>
+            <a:off x="2309570" y="3861524"/>
+            <a:ext cx="1324568" cy="1324568"/>
+          </a:xfrm>
+          <a:prstGeom prst="rect">
+            <a:avLst/>
+          </a:prstGeom>
+        </p:spPr>
+      </p:pic>
+      <p:pic>
+        <p:nvPicPr>
+          <p:cNvPr id="25" name="Grafik 24" descr="Ein Bild, das Gebäude, sitzend, Rock, Stein enthält.&#10;&#10;Automatisch generierte Beschreibung">
+            <a:extLst>
+              <a:ext uri="{FF2B5EF4-FFF2-40B4-BE49-F238E27FC236}">
+                <a16:creationId xmlns:a16="http://schemas.microsoft.com/office/drawing/2014/main" id="{8AE14ACE-ED1F-4CD4-9B6B-F93B2DAF4B34}"/>
+              </a:ext>
+            </a:extLst>
+          </p:cNvPr>
+          <p:cNvPicPr>
+            <a:picLocks noChangeAspect="1"/>
+          </p:cNvPicPr>
+          <p:nvPr/>
+        </p:nvPicPr>
+        <p:blipFill>
+          <a:blip r:embed="rId5">
+            <a:extLst>
+              <a:ext uri="{28A0092B-C50C-407E-A947-70E740481C1C}">
+                <a14:useLocalDpi xmlns:a14="http://schemas.microsoft.com/office/drawing/2010/main" val="0"/>
+              </a:ext>
+            </a:extLst>
+          </a:blip>
+          <a:stretch>
+            <a:fillRect/>
+          </a:stretch>
+        </p:blipFill>
+        <p:spPr>
+          <a:xfrm>
+            <a:off x="493343" y="3861524"/>
+            <a:ext cx="1324568" cy="1324568"/>
+          </a:xfrm>
+          <a:prstGeom prst="rect">
+            <a:avLst/>
+          </a:prstGeom>
+        </p:spPr>
+      </p:pic>
+      <p:pic>
+        <p:nvPicPr>
+          <p:cNvPr id="27" name="Grafik 26" descr="Ein Bild, das Gebäude, sitzend, Bär, alt enthält.&#10;&#10;Automatisch generierte Beschreibung">
+            <a:extLst>
+              <a:ext uri="{FF2B5EF4-FFF2-40B4-BE49-F238E27FC236}">
+                <a16:creationId xmlns:a16="http://schemas.microsoft.com/office/drawing/2014/main" id="{C01C3D17-4160-4A1E-8B68-1CEF156BC14F}"/>
+              </a:ext>
+            </a:extLst>
+          </p:cNvPr>
+          <p:cNvPicPr>
+            <a:picLocks noChangeAspect="1"/>
+          </p:cNvPicPr>
+          <p:nvPr/>
+        </p:nvPicPr>
+        <p:blipFill>
+          <a:blip r:embed="rId6">
+            <a:extLst>
+              <a:ext uri="{28A0092B-C50C-407E-A947-70E740481C1C}">
+                <a14:useLocalDpi xmlns:a14="http://schemas.microsoft.com/office/drawing/2010/main" val="0"/>
+              </a:ext>
+            </a:extLst>
+          </a:blip>
+          <a:stretch>
+            <a:fillRect/>
+          </a:stretch>
+        </p:blipFill>
+        <p:spPr>
+          <a:xfrm>
+            <a:off x="493343" y="2019565"/>
+            <a:ext cx="1324568" cy="1324568"/>
+          </a:xfrm>
+          <a:prstGeom prst="rect">
+            <a:avLst/>
+          </a:prstGeom>
+        </p:spPr>
+      </p:pic>
+      <p:sp>
+        <p:nvSpPr>
+          <p:cNvPr id="31" name="Textfeld 30">
+            <a:extLst>
+              <a:ext uri="{FF2B5EF4-FFF2-40B4-BE49-F238E27FC236}">
+                <a16:creationId xmlns:a16="http://schemas.microsoft.com/office/drawing/2014/main" id="{C3836DD2-FAB6-439F-BC94-000ECE0CB83C}"/>
               </a:ext>
             </a:extLst>
           </p:cNvPr>
@@ -5420,8 +5644,8 @@
         </p:nvSpPr>
         <p:spPr>
           <a:xfrm>
-            <a:off x="3539064" y="3658196"/>
-            <a:ext cx="3736792" cy="1384995"/>
+            <a:off x="1892058" y="2497183"/>
+            <a:ext cx="343364" cy="369332"/>
           </a:xfrm>
           <a:prstGeom prst="rect">
             <a:avLst/>
@@ -5429,97 +5653,364 @@
           <a:noFill/>
         </p:spPr>
         <p:txBody>
-          <a:bodyPr wrap="none" rtlCol="0">
+          <a:bodyPr wrap="none" rtlCol="0" anchor="ctr">
             <a:spAutoFit/>
           </a:bodyPr>
           <a:lstStyle/>
           <a:p>
             <a:r>
-              <a:rPr lang="en-US" sz="2800" dirty="0" err="1"/>
-              <a:t>Deschaintre</a:t>
-            </a:r>
-            <a:r>
-              <a:rPr lang="en-US" sz="2800" dirty="0"/>
-              <a:t> et al., </a:t>
-            </a:r>
-          </a:p>
-          <a:p>
-            <a:r>
-              <a:rPr lang="en-US" sz="2800" dirty="0"/>
-              <a:t>	2018 (single view)</a:t>
-            </a:r>
-          </a:p>
-          <a:p>
-            <a:r>
-              <a:rPr lang="en-US" sz="2800" dirty="0"/>
-              <a:t>	2019 (multi view)</a:t>
-            </a:r>
-            <a:endParaRPr lang="de-DE" sz="2800" dirty="0"/>
-          </a:p>
-        </p:txBody>
-      </p:sp>
-      <p:sp>
-        <p:nvSpPr>
-          <p:cNvPr id="19" name="Rechteck 18">
+              <a:rPr lang="en-US" dirty="0"/>
+              <a:t>…</a:t>
+            </a:r>
+            <a:endParaRPr lang="de-DE" dirty="0"/>
+          </a:p>
+        </p:txBody>
+      </p:sp>
+      <p:sp>
+        <p:nvSpPr>
+          <p:cNvPr id="34" name="Textfeld 33">
             <a:extLst>
               <a:ext uri="{FF2B5EF4-FFF2-40B4-BE49-F238E27FC236}">
-                <a16:creationId xmlns:a16="http://schemas.microsoft.com/office/drawing/2014/main" id="{4EEE552B-263A-4AA7-9DDC-7DA196059486}"/>
+                <a16:creationId xmlns:a16="http://schemas.microsoft.com/office/drawing/2014/main" id="{FE675FA8-C064-4792-85B7-1B370B0C538A}"/>
               </a:ext>
             </a:extLst>
           </p:cNvPr>
-          <p:cNvSpPr/>
+          <p:cNvSpPr txBox="1"/>
           <p:nvPr/>
         </p:nvSpPr>
         <p:spPr>
           <a:xfrm>
-            <a:off x="2375828" y="1146112"/>
-            <a:ext cx="6063263" cy="523220"/>
+            <a:off x="1889003" y="4339142"/>
+            <a:ext cx="343364" cy="369332"/>
           </a:xfrm>
           <a:prstGeom prst="rect">
             <a:avLst/>
           </a:prstGeom>
+          <a:noFill/>
         </p:spPr>
         <p:txBody>
-          <a:bodyPr wrap="none">
+          <a:bodyPr wrap="none" rtlCol="0" anchor="ctr">
             <a:spAutoFit/>
           </a:bodyPr>
           <a:lstStyle/>
           <a:p>
             <a:r>
-              <a:rPr lang="de-DE" sz="2800" dirty="0" err="1">
+              <a:rPr lang="en-US" dirty="0"/>
+              <a:t>…</a:t>
+            </a:r>
+            <a:endParaRPr lang="de-DE" dirty="0"/>
+          </a:p>
+        </p:txBody>
+      </p:sp>
+      <p:sp>
+        <p:nvSpPr>
+          <p:cNvPr id="35" name="Textfeld 34">
+            <a:extLst>
+              <a:ext uri="{FF2B5EF4-FFF2-40B4-BE49-F238E27FC236}">
+                <a16:creationId xmlns:a16="http://schemas.microsoft.com/office/drawing/2014/main" id="{01ABBBB7-19C6-45A4-BF95-1165CE3D4298}"/>
+              </a:ext>
+            </a:extLst>
+          </p:cNvPr>
+          <p:cNvSpPr txBox="1"/>
+          <p:nvPr/>
+        </p:nvSpPr>
+        <p:spPr>
+          <a:xfrm rot="2700000">
+            <a:off x="1972352" y="3385852"/>
+            <a:ext cx="343364" cy="369332"/>
+          </a:xfrm>
+          <a:prstGeom prst="rect">
+            <a:avLst/>
+          </a:prstGeom>
+          <a:noFill/>
+        </p:spPr>
+        <p:txBody>
+          <a:bodyPr wrap="none" rtlCol="0" anchor="ctr">
+            <a:spAutoFit/>
+          </a:bodyPr>
+          <a:lstStyle/>
+          <a:p>
+            <a:r>
+              <a:rPr lang="en-US" dirty="0"/>
+              <a:t>…</a:t>
+            </a:r>
+            <a:endParaRPr lang="de-DE" dirty="0"/>
+          </a:p>
+        </p:txBody>
+      </p:sp>
+      <p:sp>
+        <p:nvSpPr>
+          <p:cNvPr id="36" name="Textfeld 35">
+            <a:extLst>
+              <a:ext uri="{FF2B5EF4-FFF2-40B4-BE49-F238E27FC236}">
+                <a16:creationId xmlns:a16="http://schemas.microsoft.com/office/drawing/2014/main" id="{D413EDA8-F9AC-47F7-B8F7-4FD3BD292315}"/>
+              </a:ext>
+            </a:extLst>
+          </p:cNvPr>
+          <p:cNvSpPr txBox="1"/>
+          <p:nvPr/>
+        </p:nvSpPr>
+        <p:spPr>
+          <a:xfrm rot="5400000">
+            <a:off x="2892353" y="3419758"/>
+            <a:ext cx="343364" cy="369332"/>
+          </a:xfrm>
+          <a:prstGeom prst="rect">
+            <a:avLst/>
+          </a:prstGeom>
+          <a:noFill/>
+        </p:spPr>
+        <p:txBody>
+          <a:bodyPr wrap="none" rtlCol="0" anchor="ctr">
+            <a:spAutoFit/>
+          </a:bodyPr>
+          <a:lstStyle/>
+          <a:p>
+            <a:r>
+              <a:rPr lang="en-US" dirty="0"/>
+              <a:t>…</a:t>
+            </a:r>
+            <a:endParaRPr lang="de-DE" dirty="0"/>
+          </a:p>
+        </p:txBody>
+      </p:sp>
+      <p:sp>
+        <p:nvSpPr>
+          <p:cNvPr id="37" name="Textfeld 36">
+            <a:extLst>
+              <a:ext uri="{FF2B5EF4-FFF2-40B4-BE49-F238E27FC236}">
+                <a16:creationId xmlns:a16="http://schemas.microsoft.com/office/drawing/2014/main" id="{E88BFD07-51EC-4E7C-80CC-5B626A88F9C1}"/>
+              </a:ext>
+            </a:extLst>
+          </p:cNvPr>
+          <p:cNvSpPr txBox="1"/>
+          <p:nvPr/>
+        </p:nvSpPr>
+        <p:spPr>
+          <a:xfrm rot="5400000">
+            <a:off x="1052805" y="3422220"/>
+            <a:ext cx="343364" cy="369332"/>
+          </a:xfrm>
+          <a:prstGeom prst="rect">
+            <a:avLst/>
+          </a:prstGeom>
+          <a:noFill/>
+        </p:spPr>
+        <p:txBody>
+          <a:bodyPr wrap="none" rtlCol="0" anchor="ctr">
+            <a:spAutoFit/>
+          </a:bodyPr>
+          <a:lstStyle/>
+          <a:p>
+            <a:r>
+              <a:rPr lang="en-US" dirty="0"/>
+              <a:t>…</a:t>
+            </a:r>
+            <a:endParaRPr lang="de-DE" dirty="0"/>
+          </a:p>
+        </p:txBody>
+      </p:sp>
+      <p:sp>
+        <p:nvSpPr>
+          <p:cNvPr id="39" name="AutoShape 3">
+            <a:extLst>
+              <a:ext uri="{FF2B5EF4-FFF2-40B4-BE49-F238E27FC236}">
+                <a16:creationId xmlns:a16="http://schemas.microsoft.com/office/drawing/2014/main" id="{B1C356CF-CF59-486E-BB76-6499A60E8740}"/>
+              </a:ext>
+            </a:extLst>
+          </p:cNvPr>
+          <p:cNvSpPr>
+            <a:spLocks noChangeAspect="1" noChangeArrowheads="1" noTextEdit="1"/>
+          </p:cNvSpPr>
+          <p:nvPr/>
+        </p:nvSpPr>
+        <p:spPr bwMode="auto">
+          <a:xfrm>
+            <a:off x="7731629" y="1739928"/>
+            <a:ext cx="3814762" cy="3709987"/>
+          </a:xfrm>
+          <a:prstGeom prst="rect">
+            <a:avLst/>
+          </a:prstGeom>
+          <a:noFill/>
+          <a:ln>
+            <a:noFill/>
+          </a:ln>
+          <a:extLst>
+            <a:ext uri="{909E8E84-426E-40DD-AFC4-6F175D3DCCD1}">
+              <a14:hiddenFill xmlns:a14="http://schemas.microsoft.com/office/drawing/2010/main">
                 <a:solidFill>
-                  <a:srgbClr val="C50E1F"/>
+                  <a:srgbClr val="FFFFFF"/>
                 </a:solidFill>
-              </a:rPr>
-              <a:t>Physically-based</a:t>
-            </a:r>
-            <a:r>
-              <a:rPr lang="de-DE" sz="2800" dirty="0">
+              </a14:hiddenFill>
+            </a:ext>
+            <a:ext uri="{91240B29-F687-4F45-9708-019B960494DF}">
+              <a14:hiddenLine xmlns:a14="http://schemas.microsoft.com/office/drawing/2010/main" w="9525">
                 <a:solidFill>
-                  <a:srgbClr val="C50E1F"/>
+                  <a:srgbClr val="000000"/>
                 </a:solidFill>
-              </a:rPr>
-              <a:t> </a:t>
-            </a:r>
-            <a:r>
-              <a:rPr lang="de-DE" sz="2800" dirty="0" err="1">
+                <a:miter lim="800000"/>
+                <a:headEnd/>
+                <a:tailEnd/>
+              </a14:hiddenLine>
+            </a:ext>
+          </a:extLst>
+        </p:spPr>
+        <p:txBody>
+          <a:bodyPr vert="horz" wrap="square" lIns="91440" tIns="45720" rIns="91440" bIns="45720" numCol="1" anchor="t" anchorCtr="0" compatLnSpc="1">
+            <a:prstTxWarp prst="textNoShape">
+              <a:avLst/>
+            </a:prstTxWarp>
+          </a:bodyPr>
+          <a:lstStyle/>
+          <a:p>
+            <a:endParaRPr lang="de-DE"/>
+          </a:p>
+        </p:txBody>
+      </p:sp>
+      <p:pic>
+        <p:nvPicPr>
+          <p:cNvPr id="1029" name="Picture 5">
+            <a:extLst>
+              <a:ext uri="{FF2B5EF4-FFF2-40B4-BE49-F238E27FC236}">
+                <a16:creationId xmlns:a16="http://schemas.microsoft.com/office/drawing/2014/main" id="{7BB3C6D0-AF49-4151-9C01-3E859F5AA89C}"/>
+              </a:ext>
+            </a:extLst>
+          </p:cNvPr>
+          <p:cNvPicPr>
+            <a:picLocks noChangeAspect="1" noChangeArrowheads="1"/>
+          </p:cNvPicPr>
+          <p:nvPr/>
+        </p:nvPicPr>
+        <p:blipFill>
+          <a:blip r:embed="rId7">
+            <a:extLst>
+              <a:ext uri="{28A0092B-C50C-407E-A947-70E740481C1C}">
+                <a14:useLocalDpi xmlns:a14="http://schemas.microsoft.com/office/drawing/2010/main" val="0"/>
+              </a:ext>
+            </a:extLst>
+          </a:blip>
+          <a:srcRect/>
+          <a:stretch>
+            <a:fillRect/>
+          </a:stretch>
+        </p:blipFill>
+        <p:spPr bwMode="auto">
+          <a:xfrm>
+            <a:off x="7731629" y="1739928"/>
+            <a:ext cx="3825874" cy="3719512"/>
+          </a:xfrm>
+          <a:prstGeom prst="rect">
+            <a:avLst/>
+          </a:prstGeom>
+          <a:noFill/>
+          <a:ln>
+            <a:noFill/>
+          </a:ln>
+          <a:extLst>
+            <a:ext uri="{909E8E84-426E-40DD-AFC4-6F175D3DCCD1}">
+              <a14:hiddenFill xmlns:a14="http://schemas.microsoft.com/office/drawing/2010/main">
                 <a:solidFill>
-                  <a:srgbClr val="C50E1F"/>
+                  <a:srgbClr val="FFFFFF"/>
                 </a:solidFill>
-              </a:rPr>
-              <a:t>Differentiable</a:t>
-            </a:r>
-            <a:r>
-              <a:rPr lang="de-DE" sz="2800" dirty="0">
+              </a14:hiddenFill>
+            </a:ext>
+            <a:ext uri="{91240B29-F687-4F45-9708-019B960494DF}">
+              <a14:hiddenLine xmlns:a14="http://schemas.microsoft.com/office/drawing/2010/main" w="9525">
                 <a:solidFill>
-                  <a:srgbClr val="C50E1F"/>
+                  <a:srgbClr val="000000"/>
                 </a:solidFill>
-              </a:rPr>
-              <a:t> Renderer</a:t>
-            </a:r>
-          </a:p>
-        </p:txBody>
-      </p:sp>
+                <a:miter lim="800000"/>
+                <a:headEnd/>
+                <a:tailEnd/>
+              </a14:hiddenLine>
+            </a:ext>
+          </a:extLst>
+        </p:spPr>
+      </p:pic>
+      <p:pic>
+        <p:nvPicPr>
+          <p:cNvPr id="41" name="Grafik 40" descr="Ein Bild, das Gebäude, Foto, sitzend, Stein enthält.&#10;&#10;Automatisch generierte Beschreibung">
+            <a:extLst>
+              <a:ext uri="{FF2B5EF4-FFF2-40B4-BE49-F238E27FC236}">
+                <a16:creationId xmlns:a16="http://schemas.microsoft.com/office/drawing/2014/main" id="{CD3E45EE-CE2D-4059-BAE3-65CDF7EC5850}"/>
+              </a:ext>
+            </a:extLst>
+          </p:cNvPr>
+          <p:cNvPicPr>
+            <a:picLocks noChangeAspect="1"/>
+          </p:cNvPicPr>
+          <p:nvPr/>
+        </p:nvPicPr>
+        <p:blipFill>
+          <a:blip r:embed="rId8">
+            <a:extLst>
+              <a:ext uri="{BEBA8EAE-BF5A-486C-A8C5-ECC9F3942E4B}">
+                <a14:imgProps xmlns:a14="http://schemas.microsoft.com/office/drawing/2010/main">
+                  <a14:imgLayer r:embed="rId9">
+                    <a14:imgEffect>
+                      <a14:backgroundRemoval t="10000" b="97833" l="1167" r="97167">
+                        <a14:foregroundMark x1="87167" y1="57667" x2="90333" y2="71500"/>
+                        <a14:foregroundMark x1="90333" y1="71500" x2="88167" y2="85833"/>
+                        <a14:foregroundMark x1="88167" y1="85833" x2="74500" y2="90000"/>
+                        <a14:foregroundMark x1="74500" y1="90000" x2="68000" y2="88000"/>
+                        <a14:foregroundMark x1="91833" y1="75167" x2="94333" y2="90833"/>
+                        <a14:foregroundMark x1="94333" y1="90833" x2="82500" y2="97333"/>
+                        <a14:foregroundMark x1="82500" y1="97333" x2="56833" y2="93667"/>
+                        <a14:foregroundMark x1="91500" y1="70833" x2="97167" y2="91000"/>
+                        <a14:foregroundMark x1="87167" y1="71167" x2="79333" y2="76500"/>
+                        <a14:foregroundMark x1="9000" y1="62333" x2="6167" y2="90667"/>
+                        <a14:foregroundMark x1="6167" y1="90667" x2="29833" y2="95000"/>
+                        <a14:foregroundMark x1="3667" y1="95667" x2="1333" y2="97667"/>
+                        <a14:foregroundMark x1="92833" y1="96333" x2="94500" y2="96667"/>
+                        <a14:foregroundMark x1="44667" y1="97667" x2="44333" y2="97667"/>
+                        <a14:foregroundMark x1="66000" y1="78167" x2="71667" y2="71167"/>
+                        <a14:foregroundMark x1="86500" y1="75167" x2="73667" y2="63333"/>
+                        <a14:foregroundMark x1="73667" y1="63333" x2="62167" y2="74833"/>
+                        <a14:foregroundMark x1="62167" y1="74833" x2="70833" y2="84333"/>
+                        <a14:foregroundMark x1="70833" y1="84333" x2="82167" y2="78167"/>
+                        <a14:foregroundMark x1="82167" y1="78167" x2="82833" y2="77167"/>
+                        <a14:foregroundMark x1="93167" y1="69500" x2="92333" y2="66667"/>
+                        <a14:foregroundMark x1="93333" y1="68333" x2="93167" y2="66333"/>
+                        <a14:foregroundMark x1="93500" y1="70667" x2="92667" y2="66167"/>
+                        <a14:foregroundMark x1="93833" y1="69667" x2="93167" y2="66000"/>
+                        <a14:foregroundMark x1="16667" y1="22833" x2="17167" y2="20000"/>
+                        <a14:foregroundMark x1="16333" y1="23000" x2="16667" y2="21000"/>
+                        <a14:foregroundMark x1="15667" y1="23333" x2="16333" y2="21333"/>
+                        <a14:foregroundMark x1="11000" y1="46500" x2="11500" y2="43000"/>
+                        <a14:foregroundMark x1="37667" y1="96833" x2="44667" y2="97000"/>
+                        <a14:foregroundMark x1="44500" y1="97833" x2="44077" y2="97833"/>
+                        <a14:backgroundMark x1="45167" y1="99500" x2="37000" y2="99833"/>
+                      </a14:backgroundRemoval>
+                    </a14:imgEffect>
+                  </a14:imgLayer>
+                </a14:imgProps>
+              </a:ext>
+              <a:ext uri="{28A0092B-C50C-407E-A947-70E740481C1C}">
+                <a14:useLocalDpi xmlns:a14="http://schemas.microsoft.com/office/drawing/2010/main" val="0"/>
+              </a:ext>
+            </a:extLst>
+          </a:blip>
+          <a:stretch>
+            <a:fillRect/>
+          </a:stretch>
+        </p:blipFill>
+        <p:spPr>
+          <a:xfrm rot="16354241">
+            <a:off x="7478329" y="1298941"/>
+            <a:ext cx="3773999" cy="4039199"/>
+          </a:xfrm>
+          <a:prstGeom prst="rect">
+            <a:avLst/>
+          </a:prstGeom>
+          <a:scene3d>
+            <a:camera prst="orthographicFront">
+              <a:rot lat="2400000" lon="900000" rev="21000000"/>
+            </a:camera>
+            <a:lightRig rig="threePt" dir="t"/>
+          </a:scene3d>
+        </p:spPr>
+      </p:pic>
     </p:spTree>
     <p:extLst>
       <p:ext uri="{BB962C8B-B14F-4D97-AF65-F5344CB8AC3E}">
@@ -5572,9 +6063,115 @@
           <a:lstStyle/>
           <a:p>
             <a:r>
-              <a:rPr lang="en-US" dirty="0" smtClean="0"/>
-              <a:t>Models</a:t>
-            </a:r>
+              <a:rPr lang="en-US" dirty="0"/>
+              <a:t>Schedule</a:t>
+            </a:r>
+            <a:endParaRPr lang="de-DE" dirty="0"/>
+          </a:p>
+        </p:txBody>
+      </p:sp>
+      <p:sp>
+        <p:nvSpPr>
+          <p:cNvPr id="3" name="Inhaltsplatzhalter 2">
+            <a:extLst>
+              <a:ext uri="{FF2B5EF4-FFF2-40B4-BE49-F238E27FC236}">
+                <a16:creationId xmlns:a16="http://schemas.microsoft.com/office/drawing/2014/main" id="{AD2F8B3A-A042-43E2-9863-DCD63DF02E8F}"/>
+              </a:ext>
+            </a:extLst>
+          </p:cNvPr>
+          <p:cNvSpPr>
+            <a:spLocks noGrp="1"/>
+          </p:cNvSpPr>
+          <p:nvPr>
+            <p:ph idx="1"/>
+          </p:nvPr>
+        </p:nvSpPr>
+        <p:spPr/>
+        <p:txBody>
+          <a:bodyPr>
+            <a:normAutofit/>
+          </a:bodyPr>
+          <a:lstStyle/>
+          <a:p>
+            <a:pPr marL="514350" indent="-514350">
+              <a:buFont typeface="+mj-lt"/>
+              <a:buAutoNum type="arabicPeriod"/>
+            </a:pPr>
+            <a:r>
+              <a:rPr lang="en-US" dirty="0"/>
+              <a:t>Download database</a:t>
+            </a:r>
+          </a:p>
+          <a:p>
+            <a:pPr marL="514350" indent="-514350">
+              <a:buFont typeface="+mj-lt"/>
+              <a:buAutoNum type="arabicPeriod"/>
+            </a:pPr>
+            <a:r>
+              <a:rPr lang="en-US" dirty="0"/>
+              <a:t>Acquire testing and training code for the network</a:t>
+            </a:r>
+          </a:p>
+          <a:p>
+            <a:pPr marL="514350" indent="-514350">
+              <a:buFont typeface="+mj-lt"/>
+              <a:buAutoNum type="arabicPeriod"/>
+            </a:pPr>
+            <a:r>
+              <a:rPr lang="en-GB" dirty="0"/>
+              <a:t>Get familiar with papers, source code and data</a:t>
+            </a:r>
+          </a:p>
+          <a:p>
+            <a:pPr marL="514350" indent="-514350">
+              <a:buFont typeface="+mj-lt"/>
+              <a:buAutoNum type="arabicPeriod"/>
+            </a:pPr>
+            <a:endParaRPr lang="en-GB" dirty="0"/>
+          </a:p>
+          <a:p>
+            <a:pPr marL="514350" indent="-514350">
+              <a:buFont typeface="+mj-lt"/>
+              <a:buAutoNum type="arabicPeriod"/>
+            </a:pPr>
+            <a:r>
+              <a:rPr lang="en-US" dirty="0"/>
+              <a:t>Acquire code for Mitsuba 2</a:t>
+            </a:r>
+            <a:endParaRPr lang="en-GB" dirty="0"/>
+          </a:p>
+          <a:p>
+            <a:pPr marL="514350" indent="-514350">
+              <a:buFont typeface="+mj-lt"/>
+              <a:buAutoNum type="arabicPeriod"/>
+            </a:pPr>
+            <a:r>
+              <a:rPr lang="en-GB" dirty="0"/>
+              <a:t>Replace rendering layers of the network with Mitsuba 2</a:t>
+            </a:r>
+          </a:p>
+          <a:p>
+            <a:pPr marL="514350" indent="-514350">
+              <a:buFont typeface="+mj-lt"/>
+              <a:buAutoNum type="arabicPeriod"/>
+            </a:pPr>
+            <a:endParaRPr lang="en-GB" dirty="0"/>
+          </a:p>
+          <a:p>
+            <a:pPr marL="514350" indent="-514350">
+              <a:buFont typeface="+mj-lt"/>
+              <a:buAutoNum type="arabicPeriod"/>
+            </a:pPr>
+            <a:r>
+              <a:rPr lang="en-GB" dirty="0"/>
+              <a:t>Evaluation (compare with unmodified method)</a:t>
+            </a:r>
+            <a:endParaRPr lang="en-US" dirty="0"/>
+          </a:p>
+          <a:p>
+            <a:pPr marL="457200" lvl="1" indent="0">
+              <a:buNone/>
+            </a:pPr>
             <a:endParaRPr lang="de-DE" dirty="0"/>
           </a:p>
         </p:txBody>
@@ -5601,7 +6198,7 @@
           <a:lstStyle/>
           <a:p>
             <a:r>
-              <a:rPr lang="en-US" smtClean="0"/>
+              <a:rPr lang="en-US"/>
               <a:t>16.12.2019</a:t>
             </a:r>
             <a:endParaRPr lang="de-DE"/>
@@ -5665,64 +6262,10 @@
           </a:p>
         </p:txBody>
       </p:sp>
-      <p:sp>
-        <p:nvSpPr>
-          <p:cNvPr id="16" name="Inhaltsplatzhalter 15">
-            <a:extLst>
-              <a:ext uri="{FF2B5EF4-FFF2-40B4-BE49-F238E27FC236}">
-                <a16:creationId xmlns:a16="http://schemas.microsoft.com/office/drawing/2014/main" id="{327D1423-50F7-456B-B588-47024E008235}"/>
-              </a:ext>
-            </a:extLst>
-          </p:cNvPr>
-          <p:cNvSpPr>
-            <a:spLocks noGrp="1"/>
-          </p:cNvSpPr>
-          <p:nvPr>
-            <p:ph idx="1"/>
-          </p:nvPr>
-        </p:nvSpPr>
-        <p:spPr/>
-        <p:txBody>
-          <a:bodyPr/>
-          <a:lstStyle/>
-          <a:p>
-            <a:r>
-              <a:rPr lang="en-GB" dirty="0" smtClean="0"/>
-              <a:t>Re-implemented full Single-view Model</a:t>
-            </a:r>
-          </a:p>
-          <a:p>
-            <a:r>
-              <a:rPr lang="en-GB" dirty="0" smtClean="0"/>
-              <a:t>Multi-view Model </a:t>
-            </a:r>
-            <a:r>
-              <a:rPr lang="en-US" dirty="0" smtClean="0"/>
-              <a:t>to be done (but not urgent)</a:t>
-            </a:r>
-            <a:endParaRPr lang="en-US" dirty="0"/>
-          </a:p>
-          <a:p>
-            <a:pPr lvl="1"/>
-            <a:endParaRPr lang="en-US" dirty="0"/>
-          </a:p>
-          <a:p>
-            <a:pPr lvl="1"/>
-            <a:endParaRPr lang="en-US" dirty="0"/>
-          </a:p>
-          <a:p>
-            <a:pPr lvl="1"/>
-            <a:endParaRPr lang="en-US" dirty="0"/>
-          </a:p>
-          <a:p>
-            <a:endParaRPr lang="de-DE" dirty="0"/>
-          </a:p>
-        </p:txBody>
-      </p:sp>
     </p:spTree>
     <p:extLst>
       <p:ext uri="{BB962C8B-B14F-4D97-AF65-F5344CB8AC3E}">
-        <p14:creationId xmlns:p14="http://schemas.microsoft.com/office/powerpoint/2010/main" val="3481329519"/>
+        <p14:creationId xmlns:p14="http://schemas.microsoft.com/office/powerpoint/2010/main" val="514342988"/>
       </p:ext>
     </p:extLst>
   </p:cSld>
@@ -5771,8 +6314,8 @@
           <a:lstStyle/>
           <a:p>
             <a:r>
-              <a:rPr lang="en-US" dirty="0" smtClean="0"/>
-              <a:t>Rendering</a:t>
+              <a:rPr lang="en-US" dirty="0"/>
+              <a:t>Models</a:t>
             </a:r>
             <a:endParaRPr lang="de-DE" dirty="0"/>
           </a:p>
@@ -5800,7 +6343,7 @@
           <a:lstStyle/>
           <a:p>
             <a:r>
-              <a:rPr lang="en-US" smtClean="0"/>
+              <a:rPr lang="en-US"/>
               <a:t>16.12.2019</a:t>
             </a:r>
             <a:endParaRPr lang="de-DE"/>
@@ -5886,39 +6429,86 @@
           <a:lstStyle/>
           <a:p>
             <a:r>
-              <a:rPr lang="en-GB" dirty="0" smtClean="0"/>
-              <a:t>L1 loss between SVBRDF maps was implemented last time</a:t>
-            </a:r>
-          </a:p>
-          <a:p>
-            <a:r>
-              <a:rPr lang="en-GB" dirty="0" smtClean="0"/>
-              <a:t>Now: Rendering loss -&gt; Requires local renderer</a:t>
-            </a:r>
-          </a:p>
-          <a:p>
-            <a:r>
-              <a:rPr lang="en-GB" dirty="0" smtClean="0"/>
-              <a:t>Implemented local renderer using </a:t>
-            </a:r>
-            <a:r>
-              <a:rPr lang="en-GB" dirty="0" err="1"/>
-              <a:t>L</a:t>
-            </a:r>
-            <a:r>
-              <a:rPr lang="en-GB" dirty="0" err="1" smtClean="0"/>
-              <a:t>ambertian</a:t>
-            </a:r>
-            <a:r>
-              <a:rPr lang="en-GB" dirty="0" smtClean="0"/>
-              <a:t> Diffuse Term and Cook-Torrance specular model</a:t>
-            </a:r>
-          </a:p>
-          <a:p>
-            <a:endParaRPr lang="en-US" dirty="0"/>
-          </a:p>
-          <a:p>
-            <a:pPr lvl="1"/>
+              <a:rPr lang="en-GB" dirty="0"/>
+              <a:t>Single-view Model (</a:t>
+            </a:r>
+            <a:r>
+              <a:rPr lang="en-US" dirty="0" err="1"/>
+              <a:t>Deschaintre</a:t>
+            </a:r>
+            <a:r>
+              <a:rPr lang="en-US" dirty="0"/>
+              <a:t> et al., 2018) </a:t>
+            </a:r>
+            <a:r>
+              <a:rPr lang="de-DE" b="1" dirty="0">
+                <a:solidFill>
+                  <a:schemeClr val="accent6">
+                    <a:lumMod val="75000"/>
+                  </a:schemeClr>
+                </a:solidFill>
+              </a:rPr>
+              <a:t>✓</a:t>
+            </a:r>
+            <a:r>
+              <a:rPr lang="de-DE" dirty="0"/>
+              <a:t> </a:t>
+            </a:r>
+            <a:endParaRPr lang="en-GB" dirty="0"/>
+          </a:p>
+          <a:p>
+            <a:r>
+              <a:rPr lang="en-GB" dirty="0"/>
+              <a:t>Multi-view Model (</a:t>
+            </a:r>
+            <a:r>
+              <a:rPr lang="en-US" dirty="0" err="1"/>
+              <a:t>Deschaintre</a:t>
+            </a:r>
+            <a:r>
+              <a:rPr lang="en-US" dirty="0"/>
+              <a:t> et al., 2019)</a:t>
+            </a:r>
+            <a:r>
+              <a:rPr lang="de-DE" b="1" dirty="0">
+                <a:solidFill>
+                  <a:schemeClr val="accent6">
+                    <a:lumMod val="75000"/>
+                  </a:schemeClr>
+                </a:solidFill>
+              </a:rPr>
+              <a:t> </a:t>
+            </a:r>
+            <a:r>
+              <a:rPr lang="de-DE" dirty="0">
+                <a:solidFill>
+                  <a:schemeClr val="accent6">
+                    <a:lumMod val="75000"/>
+                  </a:schemeClr>
+                </a:solidFill>
+              </a:rPr>
+              <a:t>(</a:t>
+            </a:r>
+            <a:r>
+              <a:rPr lang="de-DE" b="1" dirty="0">
+                <a:solidFill>
+                  <a:schemeClr val="accent6">
+                    <a:lumMod val="75000"/>
+                  </a:schemeClr>
+                </a:solidFill>
+              </a:rPr>
+              <a:t>✓</a:t>
+            </a:r>
+            <a:r>
+              <a:rPr lang="de-DE" dirty="0">
+                <a:solidFill>
+                  <a:schemeClr val="accent6">
+                    <a:lumMod val="75000"/>
+                  </a:schemeClr>
+                </a:solidFill>
+              </a:rPr>
+              <a:t>)</a:t>
+            </a:r>
             <a:endParaRPr lang="en-US" dirty="0"/>
           </a:p>
           <a:p>
@@ -5937,7 +6527,7 @@
     </p:spTree>
     <p:extLst>
       <p:ext uri="{BB962C8B-B14F-4D97-AF65-F5344CB8AC3E}">
-        <p14:creationId xmlns:p14="http://schemas.microsoft.com/office/powerpoint/2010/main" val="2312750133"/>
+        <p14:creationId xmlns:p14="http://schemas.microsoft.com/office/powerpoint/2010/main" val="3481329519"/>
       </p:ext>
     </p:extLst>
   </p:cSld>
@@ -5987,7 +6577,7 @@
           <a:p>
             <a:r>
               <a:rPr lang="en-US" dirty="0"/>
-              <a:t>Integration of Path Tracer</a:t>
+              <a:t>Rendering</a:t>
             </a:r>
             <a:endParaRPr lang="de-DE" dirty="0"/>
           </a:p>
@@ -6015,7 +6605,7 @@
           <a:lstStyle/>
           <a:p>
             <a:r>
-              <a:rPr lang="en-US" smtClean="0"/>
+              <a:rPr lang="en-US"/>
               <a:t>16.12.2019</a:t>
             </a:r>
             <a:endParaRPr lang="de-DE"/>
@@ -6081,6 +6671,565 @@
       </p:sp>
       <p:sp>
         <p:nvSpPr>
+          <p:cNvPr id="16" name="Inhaltsplatzhalter 15">
+            <a:extLst>
+              <a:ext uri="{FF2B5EF4-FFF2-40B4-BE49-F238E27FC236}">
+                <a16:creationId xmlns:a16="http://schemas.microsoft.com/office/drawing/2014/main" id="{327D1423-50F7-456B-B588-47024E008235}"/>
+              </a:ext>
+            </a:extLst>
+          </p:cNvPr>
+          <p:cNvSpPr>
+            <a:spLocks noGrp="1"/>
+          </p:cNvSpPr>
+          <p:nvPr>
+            <p:ph idx="1"/>
+          </p:nvPr>
+        </p:nvSpPr>
+        <p:spPr/>
+        <p:txBody>
+          <a:bodyPr/>
+          <a:lstStyle/>
+          <a:p>
+            <a:r>
+              <a:rPr lang="en-GB" dirty="0"/>
+              <a:t>L1 loss between SVBRDF maps was implemented last time</a:t>
+            </a:r>
+          </a:p>
+          <a:p>
+            <a:r>
+              <a:rPr lang="en-GB" dirty="0"/>
+              <a:t>Now: Rendering loss -&gt; Requires local renderer</a:t>
+            </a:r>
+          </a:p>
+          <a:p>
+            <a:r>
+              <a:rPr lang="en-GB" dirty="0"/>
+              <a:t>Implemented local renderer using </a:t>
+            </a:r>
+            <a:r>
+              <a:rPr lang="en-GB" dirty="0" err="1"/>
+              <a:t>Lambertian</a:t>
+            </a:r>
+            <a:r>
+              <a:rPr lang="en-GB" dirty="0"/>
+              <a:t> Diffuse Term and Cook-Torrance specular model</a:t>
+            </a:r>
+          </a:p>
+          <a:p>
+            <a:endParaRPr lang="en-US" dirty="0"/>
+          </a:p>
+          <a:p>
+            <a:pPr lvl="1"/>
+            <a:endParaRPr lang="en-US" dirty="0"/>
+          </a:p>
+          <a:p>
+            <a:pPr lvl="1"/>
+            <a:endParaRPr lang="en-US" dirty="0"/>
+          </a:p>
+          <a:p>
+            <a:pPr lvl="1"/>
+            <a:endParaRPr lang="en-US" dirty="0"/>
+          </a:p>
+          <a:p>
+            <a:endParaRPr lang="de-DE" dirty="0"/>
+          </a:p>
+        </p:txBody>
+      </p:sp>
+    </p:spTree>
+    <p:extLst>
+      <p:ext uri="{BB962C8B-B14F-4D97-AF65-F5344CB8AC3E}">
+        <p14:creationId xmlns:p14="http://schemas.microsoft.com/office/powerpoint/2010/main" val="2312750133"/>
+      </p:ext>
+    </p:extLst>
+  </p:cSld>
+  <p:clrMapOvr>
+    <a:masterClrMapping/>
+  </p:clrMapOvr>
+</p:sld>
+</file>
+
+<file path=ppt/slides/slide6.xml><?xml version="1.0" encoding="utf-8"?>
+<p:sld xmlns:a="http://schemas.openxmlformats.org/drawingml/2006/main" xmlns:r="http://schemas.openxmlformats.org/officeDocument/2006/relationships" xmlns:p="http://schemas.openxmlformats.org/presentationml/2006/main">
+  <p:cSld>
+    <p:spTree>
+      <p:nvGrpSpPr>
+        <p:cNvPr id="1" name=""/>
+        <p:cNvGrpSpPr/>
+        <p:nvPr/>
+      </p:nvGrpSpPr>
+      <p:grpSpPr>
+        <a:xfrm>
+          <a:off x="0" y="0"/>
+          <a:ext cx="0" cy="0"/>
+          <a:chOff x="0" y="0"/>
+          <a:chExt cx="0" cy="0"/>
+        </a:xfrm>
+      </p:grpSpPr>
+      <p:sp>
+        <p:nvSpPr>
+          <p:cNvPr id="2" name="Titel 1">
+            <a:extLst>
+              <a:ext uri="{FF2B5EF4-FFF2-40B4-BE49-F238E27FC236}">
+                <a16:creationId xmlns:a16="http://schemas.microsoft.com/office/drawing/2014/main" id="{EE7F5B29-DEC6-4006-B0AA-747B696ACEE3}"/>
+              </a:ext>
+            </a:extLst>
+          </p:cNvPr>
+          <p:cNvSpPr>
+            <a:spLocks noGrp="1"/>
+          </p:cNvSpPr>
+          <p:nvPr>
+            <p:ph type="title"/>
+          </p:nvPr>
+        </p:nvSpPr>
+        <p:spPr/>
+        <p:txBody>
+          <a:bodyPr/>
+          <a:lstStyle/>
+          <a:p>
+            <a:r>
+              <a:rPr lang="en-US" dirty="0"/>
+              <a:t>Integration of Path Tracer</a:t>
+            </a:r>
+            <a:endParaRPr lang="de-DE" dirty="0"/>
+          </a:p>
+        </p:txBody>
+      </p:sp>
+      <p:sp>
+        <p:nvSpPr>
+          <p:cNvPr id="4" name="Datumsplatzhalter 3">
+            <a:extLst>
+              <a:ext uri="{FF2B5EF4-FFF2-40B4-BE49-F238E27FC236}">
+                <a16:creationId xmlns:a16="http://schemas.microsoft.com/office/drawing/2014/main" id="{705DE0FA-4D26-4C12-8D99-290D846D013E}"/>
+              </a:ext>
+            </a:extLst>
+          </p:cNvPr>
+          <p:cNvSpPr>
+            <a:spLocks noGrp="1"/>
+          </p:cNvSpPr>
+          <p:nvPr>
+            <p:ph type="dt" sz="half" idx="10"/>
+          </p:nvPr>
+        </p:nvSpPr>
+        <p:spPr/>
+        <p:txBody>
+          <a:bodyPr/>
+          <a:lstStyle/>
+          <a:p>
+            <a:r>
+              <a:rPr lang="en-US"/>
+              <a:t>16.12.2019</a:t>
+            </a:r>
+            <a:endParaRPr lang="de-DE"/>
+          </a:p>
+        </p:txBody>
+      </p:sp>
+      <p:sp>
+        <p:nvSpPr>
+          <p:cNvPr id="5" name="Fußzeilenplatzhalter 4">
+            <a:extLst>
+              <a:ext uri="{FF2B5EF4-FFF2-40B4-BE49-F238E27FC236}">
+                <a16:creationId xmlns:a16="http://schemas.microsoft.com/office/drawing/2014/main" id="{A1477BE8-0906-4D80-BD21-B1B3F005ECB0}"/>
+              </a:ext>
+            </a:extLst>
+          </p:cNvPr>
+          <p:cNvSpPr>
+            <a:spLocks noGrp="1"/>
+          </p:cNvSpPr>
+          <p:nvPr>
+            <p:ph type="ftr" sz="quarter" idx="11"/>
+          </p:nvPr>
+        </p:nvSpPr>
+        <p:spPr/>
+        <p:txBody>
+          <a:bodyPr/>
+          <a:lstStyle/>
+          <a:p>
+            <a:r>
+              <a:rPr lang="de-DE"/>
+              <a:t>Computer Graphics Project WS 2019/2020</a:t>
+            </a:r>
+          </a:p>
+        </p:txBody>
+      </p:sp>
+      <p:sp>
+        <p:nvSpPr>
+          <p:cNvPr id="6" name="Foliennummernplatzhalter 5">
+            <a:extLst>
+              <a:ext uri="{FF2B5EF4-FFF2-40B4-BE49-F238E27FC236}">
+                <a16:creationId xmlns:a16="http://schemas.microsoft.com/office/drawing/2014/main" id="{34B73023-A6CF-4E07-8B54-31CE2FA23C26}"/>
+              </a:ext>
+            </a:extLst>
+          </p:cNvPr>
+          <p:cNvSpPr>
+            <a:spLocks noGrp="1"/>
+          </p:cNvSpPr>
+          <p:nvPr>
+            <p:ph type="sldNum" sz="quarter" idx="12"/>
+          </p:nvPr>
+        </p:nvSpPr>
+        <p:spPr/>
+        <p:txBody>
+          <a:bodyPr/>
+          <a:lstStyle/>
+          <a:p>
+            <a:fld id="{50F8780B-A277-4DF9-8FC2-595931A1DBFA}" type="slidenum">
+              <a:rPr lang="de-DE" smtClean="0"/>
+              <a:t>6</a:t>
+            </a:fld>
+            <a:endParaRPr lang="de-DE"/>
+          </a:p>
+        </p:txBody>
+      </p:sp>
+      <p:sp>
+        <p:nvSpPr>
+          <p:cNvPr id="3" name="Inhaltsplatzhalter 2"/>
+          <p:cNvSpPr>
+            <a:spLocks noGrp="1"/>
+          </p:cNvSpPr>
+          <p:nvPr>
+            <p:ph idx="1"/>
+          </p:nvPr>
+        </p:nvSpPr>
+        <p:spPr/>
+        <p:txBody>
+          <a:bodyPr/>
+          <a:lstStyle/>
+          <a:p>
+            <a:r>
+              <a:rPr lang="en-GB" dirty="0"/>
+              <a:t>Mitsuba 2 still not released</a:t>
+            </a:r>
+            <a:br>
+              <a:rPr lang="en-GB" dirty="0"/>
+            </a:br>
+            <a:r>
+              <a:rPr lang="de-DE" b="1" dirty="0"/>
+              <a:t>→ </a:t>
+            </a:r>
+            <a:r>
+              <a:rPr lang="en-GB" dirty="0"/>
+              <a:t>Fall back to Redner </a:t>
+            </a:r>
+            <a:r>
+              <a:rPr lang="de-DE" b="1" dirty="0">
+                <a:solidFill>
+                  <a:schemeClr val="accent6">
+                    <a:lumMod val="75000"/>
+                  </a:schemeClr>
+                </a:solidFill>
+              </a:rPr>
+              <a:t>✓</a:t>
+            </a:r>
+          </a:p>
+          <a:p>
+            <a:endParaRPr lang="en-GB" dirty="0"/>
+          </a:p>
+          <a:p>
+            <a:r>
+              <a:rPr lang="en-GB" dirty="0"/>
+              <a:t>Redner is not compatible with Windows (requires GCC </a:t>
+            </a:r>
+            <a:r>
+              <a:rPr lang="en-GB" dirty="0" err="1"/>
+              <a:t>intrinsics</a:t>
+            </a:r>
+            <a:r>
+              <a:rPr lang="en-GB" dirty="0"/>
+              <a:t>)</a:t>
+            </a:r>
+            <a:br>
+              <a:rPr lang="en-GB" dirty="0"/>
+            </a:br>
+            <a:r>
+              <a:rPr lang="de-DE" b="1" dirty="0"/>
+              <a:t>→ </a:t>
+            </a:r>
+            <a:r>
+              <a:rPr lang="en-GB" dirty="0"/>
+              <a:t>Patch Redner code </a:t>
+            </a:r>
+            <a:r>
+              <a:rPr lang="de-DE" b="1" dirty="0">
+                <a:solidFill>
+                  <a:schemeClr val="accent6">
+                    <a:lumMod val="75000"/>
+                  </a:schemeClr>
+                </a:solidFill>
+              </a:rPr>
+              <a:t>✓</a:t>
+            </a:r>
+            <a:br>
+              <a:rPr lang="de-DE" b="1" dirty="0">
+                <a:solidFill>
+                  <a:schemeClr val="accent6">
+                    <a:lumMod val="75000"/>
+                  </a:schemeClr>
+                </a:solidFill>
+              </a:rPr>
+            </a:br>
+            <a:r>
+              <a:rPr lang="de-DE" b="1" dirty="0"/>
+              <a:t>→ </a:t>
+            </a:r>
+            <a:r>
+              <a:rPr lang="en-GB" dirty="0"/>
+              <a:t>Send PR to upstream repository </a:t>
+            </a:r>
+            <a:r>
+              <a:rPr lang="de-DE" b="1" dirty="0">
+                <a:solidFill>
+                  <a:schemeClr val="accent6">
+                    <a:lumMod val="75000"/>
+                  </a:schemeClr>
+                </a:solidFill>
+              </a:rPr>
+              <a:t>✓</a:t>
+            </a:r>
+          </a:p>
+          <a:p>
+            <a:endParaRPr lang="en-GB" dirty="0"/>
+          </a:p>
+          <a:p>
+            <a:r>
+              <a:rPr lang="en-GB" dirty="0"/>
+              <a:t>Uses </a:t>
+            </a:r>
+            <a:r>
+              <a:rPr lang="en-GB" dirty="0" err="1"/>
+              <a:t>OpenEXR</a:t>
+            </a:r>
+            <a:r>
+              <a:rPr lang="en-GB" dirty="0"/>
+              <a:t> python bindings (no Windows compatibility)</a:t>
+            </a:r>
+            <a:r>
+              <a:rPr lang="de-DE" b="1" dirty="0"/>
+              <a:t> </a:t>
+            </a:r>
+            <a:br>
+              <a:rPr lang="de-DE" b="1" dirty="0"/>
+            </a:br>
+            <a:r>
+              <a:rPr lang="de-DE" b="1" dirty="0"/>
+              <a:t>→ </a:t>
+            </a:r>
+            <a:r>
+              <a:rPr lang="en-GB" dirty="0"/>
+              <a:t>Patch </a:t>
+            </a:r>
+            <a:r>
+              <a:rPr lang="en-GB" dirty="0" err="1"/>
+              <a:t>OpenEXRPython</a:t>
+            </a:r>
+            <a:r>
+              <a:rPr lang="en-GB" dirty="0"/>
+              <a:t> code </a:t>
+            </a:r>
+            <a:r>
+              <a:rPr lang="de-DE" b="1" dirty="0">
+                <a:solidFill>
+                  <a:schemeClr val="accent6">
+                    <a:lumMod val="75000"/>
+                  </a:schemeClr>
+                </a:solidFill>
+              </a:rPr>
+              <a:t>✓</a:t>
+            </a:r>
+            <a:br>
+              <a:rPr lang="de-DE" b="1" dirty="0">
+                <a:solidFill>
+                  <a:schemeClr val="accent6">
+                    <a:lumMod val="75000"/>
+                  </a:schemeClr>
+                </a:solidFill>
+              </a:rPr>
+            </a:br>
+            <a:r>
+              <a:rPr lang="de-DE" b="1" dirty="0"/>
+              <a:t>→ </a:t>
+            </a:r>
+            <a:r>
+              <a:rPr lang="en-GB" dirty="0"/>
+              <a:t>Send PR to upstream repository </a:t>
+            </a:r>
+            <a:r>
+              <a:rPr lang="de-DE" b="1" dirty="0">
+                <a:solidFill>
+                  <a:schemeClr val="accent6">
+                    <a:lumMod val="75000"/>
+                  </a:schemeClr>
+                </a:solidFill>
+              </a:rPr>
+              <a:t>✓</a:t>
+            </a:r>
+          </a:p>
+          <a:p>
+            <a:pPr marL="0" indent="0">
+              <a:buNone/>
+            </a:pPr>
+            <a:endParaRPr lang="de-DE" b="1" dirty="0">
+              <a:solidFill>
+                <a:schemeClr val="accent6">
+                  <a:lumMod val="75000"/>
+                </a:schemeClr>
+              </a:solidFill>
+            </a:endParaRPr>
+          </a:p>
+          <a:p>
+            <a:pPr marL="0" indent="0">
+              <a:buNone/>
+            </a:pPr>
+            <a:endParaRPr lang="en-GB" dirty="0"/>
+          </a:p>
+        </p:txBody>
+      </p:sp>
+    </p:spTree>
+    <p:extLst>
+      <p:ext uri="{BB962C8B-B14F-4D97-AF65-F5344CB8AC3E}">
+        <p14:creationId xmlns:p14="http://schemas.microsoft.com/office/powerpoint/2010/main" val="173557661"/>
+      </p:ext>
+    </p:extLst>
+  </p:cSld>
+  <p:clrMapOvr>
+    <a:masterClrMapping/>
+  </p:clrMapOvr>
+</p:sld>
+</file>
+
+<file path=ppt/slides/slide7.xml><?xml version="1.0" encoding="utf-8"?>
+<p:sld xmlns:a="http://schemas.openxmlformats.org/drawingml/2006/main" xmlns:r="http://schemas.openxmlformats.org/officeDocument/2006/relationships" xmlns:p="http://schemas.openxmlformats.org/presentationml/2006/main">
+  <p:cSld>
+    <p:spTree>
+      <p:nvGrpSpPr>
+        <p:cNvPr id="1" name=""/>
+        <p:cNvGrpSpPr/>
+        <p:nvPr/>
+      </p:nvGrpSpPr>
+      <p:grpSpPr>
+        <a:xfrm>
+          <a:off x="0" y="0"/>
+          <a:ext cx="0" cy="0"/>
+          <a:chOff x="0" y="0"/>
+          <a:chExt cx="0" cy="0"/>
+        </a:xfrm>
+      </p:grpSpPr>
+      <p:sp>
+        <p:nvSpPr>
+          <p:cNvPr id="2" name="Titel 1">
+            <a:extLst>
+              <a:ext uri="{FF2B5EF4-FFF2-40B4-BE49-F238E27FC236}">
+                <a16:creationId xmlns:a16="http://schemas.microsoft.com/office/drawing/2014/main" id="{EE7F5B29-DEC6-4006-B0AA-747B696ACEE3}"/>
+              </a:ext>
+            </a:extLst>
+          </p:cNvPr>
+          <p:cNvSpPr>
+            <a:spLocks noGrp="1"/>
+          </p:cNvSpPr>
+          <p:nvPr>
+            <p:ph type="title"/>
+          </p:nvPr>
+        </p:nvSpPr>
+        <p:spPr/>
+        <p:txBody>
+          <a:bodyPr/>
+          <a:lstStyle/>
+          <a:p>
+            <a:r>
+              <a:rPr lang="en-US" dirty="0"/>
+              <a:t>Integration of Path Tracer</a:t>
+            </a:r>
+            <a:endParaRPr lang="de-DE" dirty="0"/>
+          </a:p>
+        </p:txBody>
+      </p:sp>
+      <p:sp>
+        <p:nvSpPr>
+          <p:cNvPr id="4" name="Datumsplatzhalter 3">
+            <a:extLst>
+              <a:ext uri="{FF2B5EF4-FFF2-40B4-BE49-F238E27FC236}">
+                <a16:creationId xmlns:a16="http://schemas.microsoft.com/office/drawing/2014/main" id="{705DE0FA-4D26-4C12-8D99-290D846D013E}"/>
+              </a:ext>
+            </a:extLst>
+          </p:cNvPr>
+          <p:cNvSpPr>
+            <a:spLocks noGrp="1"/>
+          </p:cNvSpPr>
+          <p:nvPr>
+            <p:ph type="dt" sz="half" idx="10"/>
+          </p:nvPr>
+        </p:nvSpPr>
+        <p:spPr/>
+        <p:txBody>
+          <a:bodyPr/>
+          <a:lstStyle/>
+          <a:p>
+            <a:r>
+              <a:rPr lang="en-US"/>
+              <a:t>16.12.2019</a:t>
+            </a:r>
+            <a:endParaRPr lang="de-DE"/>
+          </a:p>
+        </p:txBody>
+      </p:sp>
+      <p:sp>
+        <p:nvSpPr>
+          <p:cNvPr id="5" name="Fußzeilenplatzhalter 4">
+            <a:extLst>
+              <a:ext uri="{FF2B5EF4-FFF2-40B4-BE49-F238E27FC236}">
+                <a16:creationId xmlns:a16="http://schemas.microsoft.com/office/drawing/2014/main" id="{A1477BE8-0906-4D80-BD21-B1B3F005ECB0}"/>
+              </a:ext>
+            </a:extLst>
+          </p:cNvPr>
+          <p:cNvSpPr>
+            <a:spLocks noGrp="1"/>
+          </p:cNvSpPr>
+          <p:nvPr>
+            <p:ph type="ftr" sz="quarter" idx="11"/>
+          </p:nvPr>
+        </p:nvSpPr>
+        <p:spPr/>
+        <p:txBody>
+          <a:bodyPr/>
+          <a:lstStyle/>
+          <a:p>
+            <a:r>
+              <a:rPr lang="de-DE"/>
+              <a:t>Computer Graphics Project WS 2019/2020</a:t>
+            </a:r>
+          </a:p>
+        </p:txBody>
+      </p:sp>
+      <p:sp>
+        <p:nvSpPr>
+          <p:cNvPr id="6" name="Foliennummernplatzhalter 5">
+            <a:extLst>
+              <a:ext uri="{FF2B5EF4-FFF2-40B4-BE49-F238E27FC236}">
+                <a16:creationId xmlns:a16="http://schemas.microsoft.com/office/drawing/2014/main" id="{34B73023-A6CF-4E07-8B54-31CE2FA23C26}"/>
+              </a:ext>
+            </a:extLst>
+          </p:cNvPr>
+          <p:cNvSpPr>
+            <a:spLocks noGrp="1"/>
+          </p:cNvSpPr>
+          <p:nvPr>
+            <p:ph type="sldNum" sz="quarter" idx="12"/>
+          </p:nvPr>
+        </p:nvSpPr>
+        <p:spPr/>
+        <p:txBody>
+          <a:bodyPr/>
+          <a:lstStyle/>
+          <a:p>
+            <a:fld id="{50F8780B-A277-4DF9-8FC2-595931A1DBFA}" type="slidenum">
+              <a:rPr lang="de-DE" smtClean="0"/>
+              <a:t>7</a:t>
+            </a:fld>
+            <a:endParaRPr lang="de-DE"/>
+          </a:p>
+        </p:txBody>
+      </p:sp>
+      <p:sp>
+        <p:nvSpPr>
           <p:cNvPr id="52" name="Inhaltsplatzhalter 2">
             <a:extLst>
               <a:ext uri="{FF2B5EF4-FFF2-40B4-BE49-F238E27FC236}">
@@ -6108,39 +7257,39 @@
           <a:lstStyle/>
           <a:p>
             <a:r>
-              <a:rPr lang="en-US" dirty="0" smtClean="0"/>
+              <a:rPr lang="en-US" dirty="0"/>
               <a:t>Current rendering loss uses a trick to use as many information as possible</a:t>
             </a:r>
           </a:p>
           <a:p>
             <a:r>
-              <a:rPr lang="en-GB" dirty="0" smtClean="0"/>
+              <a:rPr lang="en-GB" dirty="0"/>
               <a:t>Given camera and light position looks like this</a:t>
             </a:r>
           </a:p>
           <a:p>
-            <a:endParaRPr lang="en-GB" b="1" dirty="0" smtClean="0"/>
-          </a:p>
-          <a:p>
             <a:endParaRPr lang="en-GB" b="1" dirty="0"/>
           </a:p>
           <a:p>
-            <a:endParaRPr lang="en-GB" b="1" dirty="0" smtClean="0"/>
-          </a:p>
-          <a:p>
             <a:endParaRPr lang="en-GB" b="1" dirty="0"/>
           </a:p>
           <a:p>
-            <a:r>
-              <a:rPr lang="en-GB" dirty="0" smtClean="0"/>
+            <a:endParaRPr lang="en-GB" b="1" dirty="0"/>
+          </a:p>
+          <a:p>
+            <a:endParaRPr lang="en-GB" b="1" dirty="0"/>
+          </a:p>
+          <a:p>
+            <a:r>
+              <a:rPr lang="en-GB" dirty="0"/>
               <a:t>But renderer renders it like this (</a:t>
             </a:r>
             <a:r>
-              <a:rPr lang="en-GB" dirty="0" err="1" smtClean="0"/>
+              <a:rPr lang="en-GB" dirty="0" err="1"/>
               <a:t>homography</a:t>
             </a:r>
             <a:r>
-              <a:rPr lang="en-GB" dirty="0" smtClean="0"/>
+              <a:rPr lang="en-GB" dirty="0"/>
               <a:t> to orthogonal view)</a:t>
             </a:r>
             <a:endParaRPr lang="en-US" dirty="0"/>
@@ -6908,7 +8057,7 @@
 </p:sld>
 </file>
 
-<file path=ppt/slides/slide6.xml><?xml version="1.0" encoding="utf-8"?>
+<file path=ppt/slides/slide8.xml><?xml version="1.0" encoding="utf-8"?>
 <p:sld xmlns:a="http://schemas.openxmlformats.org/drawingml/2006/main" xmlns:r="http://schemas.openxmlformats.org/officeDocument/2006/relationships" xmlns:p="http://schemas.openxmlformats.org/presentationml/2006/main">
   <p:cSld>
     <p:spTree>
@@ -6947,9 +8096,128 @@
           <a:lstStyle/>
           <a:p>
             <a:r>
-              <a:rPr lang="en-US" dirty="0" smtClean="0"/>
-              <a:t>Integration of Path Tracer</a:t>
-            </a:r>
+              <a:rPr lang="en-US" dirty="0"/>
+              <a:t>Schedule</a:t>
+            </a:r>
+            <a:endParaRPr lang="de-DE" dirty="0"/>
+          </a:p>
+        </p:txBody>
+      </p:sp>
+      <p:sp>
+        <p:nvSpPr>
+          <p:cNvPr id="3" name="Inhaltsplatzhalter 2">
+            <a:extLst>
+              <a:ext uri="{FF2B5EF4-FFF2-40B4-BE49-F238E27FC236}">
+                <a16:creationId xmlns:a16="http://schemas.microsoft.com/office/drawing/2014/main" id="{AD2F8B3A-A042-43E2-9863-DCD63DF02E8F}"/>
+              </a:ext>
+            </a:extLst>
+          </p:cNvPr>
+          <p:cNvSpPr>
+            <a:spLocks noGrp="1"/>
+          </p:cNvSpPr>
+          <p:nvPr>
+            <p:ph idx="1"/>
+          </p:nvPr>
+        </p:nvSpPr>
+        <p:spPr/>
+        <p:txBody>
+          <a:bodyPr>
+            <a:normAutofit/>
+          </a:bodyPr>
+          <a:lstStyle/>
+          <a:p>
+            <a:pPr marL="514350" indent="-514350">
+              <a:buFont typeface="+mj-lt"/>
+              <a:buAutoNum type="arabicPeriod"/>
+            </a:pPr>
+            <a:r>
+              <a:rPr lang="en-US" dirty="0"/>
+              <a:t>Download database</a:t>
+            </a:r>
+          </a:p>
+          <a:p>
+            <a:pPr marL="514350" indent="-514350">
+              <a:buFont typeface="+mj-lt"/>
+              <a:buAutoNum type="arabicPeriod"/>
+            </a:pPr>
+            <a:r>
+              <a:rPr lang="en-US" dirty="0"/>
+              <a:t>Acquire testing and training code for the network</a:t>
+            </a:r>
+          </a:p>
+          <a:p>
+            <a:pPr lvl="1"/>
+            <a:r>
+              <a:rPr lang="en-US" dirty="0"/>
+              <a:t>Contact authors for training code</a:t>
+            </a:r>
+          </a:p>
+          <a:p>
+            <a:pPr lvl="1"/>
+            <a:r>
+              <a:rPr lang="en-US" dirty="0"/>
+              <a:t>Fallback: Re-implementation</a:t>
+            </a:r>
+          </a:p>
+          <a:p>
+            <a:pPr marL="514350" indent="-514350">
+              <a:buFont typeface="+mj-lt"/>
+              <a:buAutoNum type="arabicPeriod"/>
+            </a:pPr>
+            <a:r>
+              <a:rPr lang="en-US" dirty="0"/>
+              <a:t>Acquire code for Mitsuba 2</a:t>
+            </a:r>
+          </a:p>
+          <a:p>
+            <a:pPr lvl="1"/>
+            <a:r>
+              <a:rPr lang="en-US" dirty="0"/>
+              <a:t>Not yet officially released</a:t>
+            </a:r>
+          </a:p>
+          <a:p>
+            <a:pPr lvl="1"/>
+            <a:r>
+              <a:rPr lang="en-US" dirty="0"/>
+              <a:t>Fallback: Use other renderer like render (Li et al., 2018)</a:t>
+            </a:r>
+          </a:p>
+          <a:p>
+            <a:pPr marL="514350" indent="-514350">
+              <a:buFont typeface="+mj-lt"/>
+              <a:buAutoNum type="arabicPeriod"/>
+            </a:pPr>
+            <a:r>
+              <a:rPr lang="en-GB" dirty="0"/>
+              <a:t>Get familiar with papers, source code and data</a:t>
+            </a:r>
+          </a:p>
+          <a:p>
+            <a:pPr marL="514350" indent="-514350">
+              <a:buFont typeface="+mj-lt"/>
+              <a:buAutoNum type="arabicPeriod"/>
+            </a:pPr>
+            <a:r>
+              <a:rPr lang="en-GB" dirty="0"/>
+              <a:t>Replace rendering layers of the network with Mitsuba 2</a:t>
+            </a:r>
+          </a:p>
+          <a:p>
+            <a:pPr marL="514350" indent="-514350">
+              <a:buFont typeface="+mj-lt"/>
+              <a:buAutoNum type="arabicPeriod"/>
+            </a:pPr>
+            <a:r>
+              <a:rPr lang="en-GB" dirty="0"/>
+              <a:t>Evaluation (compare with unmodified method)</a:t>
+            </a:r>
+            <a:endParaRPr lang="en-US" dirty="0"/>
+          </a:p>
+          <a:p>
+            <a:pPr marL="457200" lvl="1" indent="0">
+              <a:buNone/>
+            </a:pPr>
             <a:endParaRPr lang="de-DE" dirty="0"/>
           </a:p>
         </p:txBody>
@@ -6976,7 +8244,7 @@
           <a:lstStyle/>
           <a:p>
             <a:r>
-              <a:rPr lang="en-US" smtClean="0"/>
+              <a:rPr lang="en-US"/>
               <a:t>16.12.2019</a:t>
             </a:r>
             <a:endParaRPr lang="de-DE"/>
@@ -7034,322 +8302,7 @@
           <a:p>
             <a:fld id="{50F8780B-A277-4DF9-8FC2-595931A1DBFA}" type="slidenum">
               <a:rPr lang="de-DE" smtClean="0"/>
-              <a:t>6</a:t>
-            </a:fld>
-            <a:endParaRPr lang="de-DE"/>
-          </a:p>
-        </p:txBody>
-      </p:sp>
-      <p:sp>
-        <p:nvSpPr>
-          <p:cNvPr id="3" name="Inhaltsplatzhalter 2"/>
-          <p:cNvSpPr>
-            <a:spLocks noGrp="1"/>
-          </p:cNvSpPr>
-          <p:nvPr>
-            <p:ph idx="1"/>
-          </p:nvPr>
-        </p:nvSpPr>
-        <p:spPr/>
-        <p:txBody>
-          <a:bodyPr/>
-          <a:lstStyle/>
-          <a:p>
-            <a:r>
-              <a:rPr lang="en-GB" dirty="0" smtClean="0"/>
-              <a:t>Mitsuba 2 still not released!</a:t>
-            </a:r>
-          </a:p>
-          <a:p>
-            <a:r>
-              <a:rPr lang="en-GB" dirty="0" smtClean="0"/>
-              <a:t>Fall back to </a:t>
-            </a:r>
-            <a:r>
-              <a:rPr lang="en-GB" dirty="0" err="1" smtClean="0"/>
-              <a:t>Redner</a:t>
-            </a:r>
-            <a:endParaRPr lang="en-GB" dirty="0" smtClean="0"/>
-          </a:p>
-          <a:p>
-            <a:r>
-              <a:rPr lang="en-GB" dirty="0" err="1" smtClean="0"/>
-              <a:t>Redner</a:t>
-            </a:r>
-            <a:r>
-              <a:rPr lang="en-GB" dirty="0" smtClean="0"/>
-              <a:t> not for Windows</a:t>
-            </a:r>
-            <a:r>
-              <a:rPr lang="en-DE" dirty="0" smtClean="0"/>
-              <a:t>…</a:t>
-            </a:r>
-            <a:r>
-              <a:rPr lang="en-GB" dirty="0" smtClean="0"/>
-              <a:t> but I’m using it</a:t>
-            </a:r>
-          </a:p>
-        </p:txBody>
-      </p:sp>
-    </p:spTree>
-    <p:extLst>
-      <p:ext uri="{BB962C8B-B14F-4D97-AF65-F5344CB8AC3E}">
-        <p14:creationId xmlns:p14="http://schemas.microsoft.com/office/powerpoint/2010/main" val="173557661"/>
-      </p:ext>
-    </p:extLst>
-  </p:cSld>
-  <p:clrMapOvr>
-    <a:masterClrMapping/>
-  </p:clrMapOvr>
-</p:sld>
-</file>
-
-<file path=ppt/slides/slide7.xml><?xml version="1.0" encoding="utf-8"?>
-<p:sld xmlns:a="http://schemas.openxmlformats.org/drawingml/2006/main" xmlns:r="http://schemas.openxmlformats.org/officeDocument/2006/relationships" xmlns:p="http://schemas.openxmlformats.org/presentationml/2006/main">
-  <p:cSld>
-    <p:spTree>
-      <p:nvGrpSpPr>
-        <p:cNvPr id="1" name=""/>
-        <p:cNvGrpSpPr/>
-        <p:nvPr/>
-      </p:nvGrpSpPr>
-      <p:grpSpPr>
-        <a:xfrm>
-          <a:off x="0" y="0"/>
-          <a:ext cx="0" cy="0"/>
-          <a:chOff x="0" y="0"/>
-          <a:chExt cx="0" cy="0"/>
-        </a:xfrm>
-      </p:grpSpPr>
-      <p:sp>
-        <p:nvSpPr>
-          <p:cNvPr id="2" name="Titel 1">
-            <a:extLst>
-              <a:ext uri="{FF2B5EF4-FFF2-40B4-BE49-F238E27FC236}">
-                <a16:creationId xmlns:a16="http://schemas.microsoft.com/office/drawing/2014/main" id="{EE7F5B29-DEC6-4006-B0AA-747B696ACEE3}"/>
-              </a:ext>
-            </a:extLst>
-          </p:cNvPr>
-          <p:cNvSpPr>
-            <a:spLocks noGrp="1"/>
-          </p:cNvSpPr>
-          <p:nvPr>
-            <p:ph type="title"/>
-          </p:nvPr>
-        </p:nvSpPr>
-        <p:spPr/>
-        <p:txBody>
-          <a:bodyPr/>
-          <a:lstStyle/>
-          <a:p>
-            <a:r>
-              <a:rPr lang="en-US" dirty="0"/>
-              <a:t>Schedule</a:t>
-            </a:r>
-            <a:endParaRPr lang="de-DE" dirty="0"/>
-          </a:p>
-        </p:txBody>
-      </p:sp>
-      <p:sp>
-        <p:nvSpPr>
-          <p:cNvPr id="3" name="Inhaltsplatzhalter 2">
-            <a:extLst>
-              <a:ext uri="{FF2B5EF4-FFF2-40B4-BE49-F238E27FC236}">
-                <a16:creationId xmlns:a16="http://schemas.microsoft.com/office/drawing/2014/main" id="{AD2F8B3A-A042-43E2-9863-DCD63DF02E8F}"/>
-              </a:ext>
-            </a:extLst>
-          </p:cNvPr>
-          <p:cNvSpPr>
-            <a:spLocks noGrp="1"/>
-          </p:cNvSpPr>
-          <p:nvPr>
-            <p:ph idx="1"/>
-          </p:nvPr>
-        </p:nvSpPr>
-        <p:spPr/>
-        <p:txBody>
-          <a:bodyPr>
-            <a:normAutofit/>
-          </a:bodyPr>
-          <a:lstStyle/>
-          <a:p>
-            <a:pPr marL="514350" indent="-514350">
-              <a:buFont typeface="+mj-lt"/>
-              <a:buAutoNum type="arabicPeriod"/>
-            </a:pPr>
-            <a:r>
-              <a:rPr lang="en-US" dirty="0"/>
-              <a:t>Download database</a:t>
-            </a:r>
-          </a:p>
-          <a:p>
-            <a:pPr marL="514350" indent="-514350">
-              <a:buFont typeface="+mj-lt"/>
-              <a:buAutoNum type="arabicPeriod"/>
-            </a:pPr>
-            <a:r>
-              <a:rPr lang="en-US" dirty="0"/>
-              <a:t>Acquire testing and training code for the network</a:t>
-            </a:r>
-          </a:p>
-          <a:p>
-            <a:pPr lvl="1"/>
-            <a:r>
-              <a:rPr lang="en-US" dirty="0"/>
-              <a:t>Contact authors for training code</a:t>
-            </a:r>
-          </a:p>
-          <a:p>
-            <a:pPr lvl="1"/>
-            <a:r>
-              <a:rPr lang="en-US" dirty="0"/>
-              <a:t>Fallback: Re-implementation</a:t>
-            </a:r>
-          </a:p>
-          <a:p>
-            <a:pPr marL="514350" indent="-514350">
-              <a:buFont typeface="+mj-lt"/>
-              <a:buAutoNum type="arabicPeriod"/>
-            </a:pPr>
-            <a:r>
-              <a:rPr lang="en-US" dirty="0"/>
-              <a:t>Acquire code for Mitsuba 2</a:t>
-            </a:r>
-          </a:p>
-          <a:p>
-            <a:pPr lvl="1"/>
-            <a:r>
-              <a:rPr lang="en-US" dirty="0"/>
-              <a:t>Not yet officially released</a:t>
-            </a:r>
-          </a:p>
-          <a:p>
-            <a:pPr lvl="1"/>
-            <a:r>
-              <a:rPr lang="en-US" dirty="0"/>
-              <a:t>Fallback: Use other renderer like render (Li et al., 2018)</a:t>
-            </a:r>
-          </a:p>
-          <a:p>
-            <a:pPr marL="514350" indent="-514350">
-              <a:buFont typeface="+mj-lt"/>
-              <a:buAutoNum type="arabicPeriod"/>
-            </a:pPr>
-            <a:r>
-              <a:rPr lang="en-GB" dirty="0"/>
-              <a:t>Get familiar with papers, source code and data</a:t>
-            </a:r>
-          </a:p>
-          <a:p>
-            <a:pPr marL="514350" indent="-514350">
-              <a:buFont typeface="+mj-lt"/>
-              <a:buAutoNum type="arabicPeriod"/>
-            </a:pPr>
-            <a:r>
-              <a:rPr lang="en-GB" dirty="0"/>
-              <a:t>Replace rendering layers of the network with Mitsuba 2</a:t>
-            </a:r>
-          </a:p>
-          <a:p>
-            <a:pPr marL="514350" indent="-514350">
-              <a:buFont typeface="+mj-lt"/>
-              <a:buAutoNum type="arabicPeriod"/>
-            </a:pPr>
-            <a:r>
-              <a:rPr lang="en-GB" dirty="0"/>
-              <a:t>Evaluation (compare with unmodified method)</a:t>
-            </a:r>
-            <a:endParaRPr lang="en-US" dirty="0"/>
-          </a:p>
-          <a:p>
-            <a:pPr marL="457200" lvl="1" indent="0">
-              <a:buNone/>
-            </a:pPr>
-            <a:endParaRPr lang="de-DE" dirty="0"/>
-          </a:p>
-        </p:txBody>
-      </p:sp>
-      <p:sp>
-        <p:nvSpPr>
-          <p:cNvPr id="4" name="Datumsplatzhalter 3">
-            <a:extLst>
-              <a:ext uri="{FF2B5EF4-FFF2-40B4-BE49-F238E27FC236}">
-                <a16:creationId xmlns:a16="http://schemas.microsoft.com/office/drawing/2014/main" id="{705DE0FA-4D26-4C12-8D99-290D846D013E}"/>
-              </a:ext>
-            </a:extLst>
-          </p:cNvPr>
-          <p:cNvSpPr>
-            <a:spLocks noGrp="1"/>
-          </p:cNvSpPr>
-          <p:nvPr>
-            <p:ph type="dt" sz="half" idx="10"/>
-          </p:nvPr>
-        </p:nvSpPr>
-        <p:spPr/>
-        <p:txBody>
-          <a:bodyPr/>
-          <a:lstStyle/>
-          <a:p>
-            <a:r>
-              <a:rPr lang="en-US" smtClean="0"/>
-              <a:t>16.12.2019</a:t>
-            </a:r>
-            <a:endParaRPr lang="de-DE"/>
-          </a:p>
-        </p:txBody>
-      </p:sp>
-      <p:sp>
-        <p:nvSpPr>
-          <p:cNvPr id="5" name="Fußzeilenplatzhalter 4">
-            <a:extLst>
-              <a:ext uri="{FF2B5EF4-FFF2-40B4-BE49-F238E27FC236}">
-                <a16:creationId xmlns:a16="http://schemas.microsoft.com/office/drawing/2014/main" id="{A1477BE8-0906-4D80-BD21-B1B3F005ECB0}"/>
-              </a:ext>
-            </a:extLst>
-          </p:cNvPr>
-          <p:cNvSpPr>
-            <a:spLocks noGrp="1"/>
-          </p:cNvSpPr>
-          <p:nvPr>
-            <p:ph type="ftr" sz="quarter" idx="11"/>
-          </p:nvPr>
-        </p:nvSpPr>
-        <p:spPr/>
-        <p:txBody>
-          <a:bodyPr/>
-          <a:lstStyle/>
-          <a:p>
-            <a:r>
-              <a:rPr lang="de-DE"/>
-              <a:t>Computer Graphics Project WS 2019/2020</a:t>
-            </a:r>
-          </a:p>
-        </p:txBody>
-      </p:sp>
-      <p:sp>
-        <p:nvSpPr>
-          <p:cNvPr id="6" name="Foliennummernplatzhalter 5">
-            <a:extLst>
-              <a:ext uri="{FF2B5EF4-FFF2-40B4-BE49-F238E27FC236}">
-                <a16:creationId xmlns:a16="http://schemas.microsoft.com/office/drawing/2014/main" id="{34B73023-A6CF-4E07-8B54-31CE2FA23C26}"/>
-              </a:ext>
-            </a:extLst>
-          </p:cNvPr>
-          <p:cNvSpPr>
-            <a:spLocks noGrp="1"/>
-          </p:cNvSpPr>
-          <p:nvPr>
-            <p:ph type="sldNum" sz="quarter" idx="12"/>
-          </p:nvPr>
-        </p:nvSpPr>
-        <p:spPr/>
-        <p:txBody>
-          <a:bodyPr/>
-          <a:lstStyle/>
-          <a:p>
-            <a:fld id="{50F8780B-A277-4DF9-8FC2-595931A1DBFA}" type="slidenum">
-              <a:rPr lang="de-DE" smtClean="0"/>
-              <a:t>7</a:t>
+              <a:t>8</a:t>
             </a:fld>
             <a:endParaRPr lang="de-DE"/>
           </a:p>
@@ -7365,14 +8318,6 @@
   <p:clrMapOvr>
     <a:masterClrMapping/>
   </p:clrMapOvr>
-  <mc:AlternateContent xmlns:mc="http://schemas.openxmlformats.org/markup-compatibility/2006">
-    <mc:Choice xmlns:p14="http://schemas.microsoft.com/office/powerpoint/2010/main" Requires="p14">
-      <p:transition spd="slow" p14:dur="2000"/>
-    </mc:Choice>
-    <mc:Fallback>
-      <p:transition spd="slow"/>
-    </mc:Fallback>
-  </mc:AlternateContent>
 </p:sld>
 </file>
 

</xml_diff>